<commit_message>
Start of interactions lecture
</commit_message>
<xml_diff>
--- a/Lecture 10 - Interaction LM/Lecture 8.1 Interactions.pptx
+++ b/Lecture 10 - Interaction LM/Lecture 8.1 Interactions.pptx
@@ -4,6 +4,9 @@
   <p:sldMasterIdLst>
     <p:sldMasterId id="2147483660" r:id="rId1"/>
   </p:sldMasterIdLst>
+  <p:notesMasterIdLst>
+    <p:notesMasterId r:id="rId20"/>
+  </p:notesMasterIdLst>
   <p:sldIdLst>
     <p:sldId id="256" r:id="rId2"/>
     <p:sldId id="348" r:id="rId3"/>
@@ -15,10 +18,14 @@
     <p:sldId id="345" r:id="rId9"/>
     <p:sldId id="342" r:id="rId10"/>
     <p:sldId id="343" r:id="rId11"/>
-    <p:sldId id="346" r:id="rId12"/>
-    <p:sldId id="347" r:id="rId13"/>
-    <p:sldId id="334" r:id="rId14"/>
-    <p:sldId id="350" r:id="rId15"/>
+    <p:sldId id="357" r:id="rId12"/>
+    <p:sldId id="346" r:id="rId13"/>
+    <p:sldId id="347" r:id="rId14"/>
+    <p:sldId id="334" r:id="rId15"/>
+    <p:sldId id="350" r:id="rId16"/>
+    <p:sldId id="356" r:id="rId17"/>
+    <p:sldId id="355" r:id="rId18"/>
+    <p:sldId id="358" r:id="rId19"/>
   </p:sldIdLst>
   <p:sldSz cx="12192000" cy="6858000"/>
   <p:notesSz cx="6858000" cy="9144000"/>
@@ -123,6 +130,440 @@
     </p:ext>
   </p:extLst>
 </p:presentation>
+</file>
+
+<file path=ppt/notesMasters/notesMaster1.xml><?xml version="1.0" encoding="utf-8"?>
+<p:notesMaster xmlns:a="http://schemas.openxmlformats.org/drawingml/2006/main" xmlns:r="http://schemas.openxmlformats.org/officeDocument/2006/relationships" xmlns:p="http://schemas.openxmlformats.org/presentationml/2006/main">
+  <p:cSld>
+    <p:bg>
+      <p:bgRef idx="1001">
+        <a:schemeClr val="bg1"/>
+      </p:bgRef>
+    </p:bg>
+    <p:spTree>
+      <p:nvGrpSpPr>
+        <p:cNvPr id="1" name=""/>
+        <p:cNvGrpSpPr/>
+        <p:nvPr/>
+      </p:nvGrpSpPr>
+      <p:grpSpPr>
+        <a:xfrm>
+          <a:off x="0" y="0"/>
+          <a:ext cx="0" cy="0"/>
+          <a:chOff x="0" y="0"/>
+          <a:chExt cx="0" cy="0"/>
+        </a:xfrm>
+      </p:grpSpPr>
+      <p:sp>
+        <p:nvSpPr>
+          <p:cNvPr id="2" name="Header Placeholder 1"/>
+          <p:cNvSpPr>
+            <a:spLocks noGrp="1"/>
+          </p:cNvSpPr>
+          <p:nvPr>
+            <p:ph type="hdr" sz="quarter"/>
+          </p:nvPr>
+        </p:nvSpPr>
+        <p:spPr>
+          <a:xfrm>
+            <a:off x="0" y="0"/>
+            <a:ext cx="2971800" cy="458788"/>
+          </a:xfrm>
+          <a:prstGeom prst="rect">
+            <a:avLst/>
+          </a:prstGeom>
+        </p:spPr>
+        <p:txBody>
+          <a:bodyPr vert="horz" lIns="91440" tIns="45720" rIns="91440" bIns="45720" rtlCol="0"/>
+          <a:lstStyle>
+            <a:lvl1pPr algn="l">
+              <a:defRPr sz="1200"/>
+            </a:lvl1pPr>
+          </a:lstStyle>
+          <a:p>
+            <a:endParaRPr lang="en-GB"/>
+          </a:p>
+        </p:txBody>
+      </p:sp>
+      <p:sp>
+        <p:nvSpPr>
+          <p:cNvPr id="3" name="Date Placeholder 2"/>
+          <p:cNvSpPr>
+            <a:spLocks noGrp="1"/>
+          </p:cNvSpPr>
+          <p:nvPr>
+            <p:ph type="dt" idx="1"/>
+          </p:nvPr>
+        </p:nvSpPr>
+        <p:spPr>
+          <a:xfrm>
+            <a:off x="3884613" y="0"/>
+            <a:ext cx="2971800" cy="458788"/>
+          </a:xfrm>
+          <a:prstGeom prst="rect">
+            <a:avLst/>
+          </a:prstGeom>
+        </p:spPr>
+        <p:txBody>
+          <a:bodyPr vert="horz" lIns="91440" tIns="45720" rIns="91440" bIns="45720" rtlCol="0"/>
+          <a:lstStyle>
+            <a:lvl1pPr algn="r">
+              <a:defRPr sz="1200"/>
+            </a:lvl1pPr>
+          </a:lstStyle>
+          <a:p>
+            <a:fld id="{FDC6A6D2-C8B7-4758-992F-557291917058}" type="datetimeFigureOut">
+              <a:rPr lang="en-GB" smtClean="0"/>
+              <a:t>02/08/2024</a:t>
+            </a:fld>
+            <a:endParaRPr lang="en-GB"/>
+          </a:p>
+        </p:txBody>
+      </p:sp>
+      <p:sp>
+        <p:nvSpPr>
+          <p:cNvPr id="4" name="Slide Image Placeholder 3"/>
+          <p:cNvSpPr>
+            <a:spLocks noGrp="1" noRot="1" noChangeAspect="1"/>
+          </p:cNvSpPr>
+          <p:nvPr>
+            <p:ph type="sldImg" idx="2"/>
+          </p:nvPr>
+        </p:nvSpPr>
+        <p:spPr>
+          <a:xfrm>
+            <a:off x="685800" y="1143000"/>
+            <a:ext cx="5486400" cy="3086100"/>
+          </a:xfrm>
+          <a:prstGeom prst="rect">
+            <a:avLst/>
+          </a:prstGeom>
+          <a:noFill/>
+          <a:ln w="12700">
+            <a:solidFill>
+              <a:prstClr val="black"/>
+            </a:solidFill>
+          </a:ln>
+        </p:spPr>
+        <p:txBody>
+          <a:bodyPr vert="horz" lIns="91440" tIns="45720" rIns="91440" bIns="45720" rtlCol="0" anchor="ctr"/>
+          <a:lstStyle/>
+          <a:p>
+            <a:endParaRPr lang="en-GB"/>
+          </a:p>
+        </p:txBody>
+      </p:sp>
+      <p:sp>
+        <p:nvSpPr>
+          <p:cNvPr id="5" name="Notes Placeholder 4"/>
+          <p:cNvSpPr>
+            <a:spLocks noGrp="1"/>
+          </p:cNvSpPr>
+          <p:nvPr>
+            <p:ph type="body" sz="quarter" idx="3"/>
+          </p:nvPr>
+        </p:nvSpPr>
+        <p:spPr>
+          <a:xfrm>
+            <a:off x="685800" y="4400550"/>
+            <a:ext cx="5486400" cy="3600450"/>
+          </a:xfrm>
+          <a:prstGeom prst="rect">
+            <a:avLst/>
+          </a:prstGeom>
+        </p:spPr>
+        <p:txBody>
+          <a:bodyPr vert="horz" lIns="91440" tIns="45720" rIns="91440" bIns="45720" rtlCol="0"/>
+          <a:lstStyle/>
+          <a:p>
+            <a:pPr lvl="0"/>
+            <a:r>
+              <a:rPr lang="en-US"/>
+              <a:t>Click to edit Master text styles</a:t>
+            </a:r>
+          </a:p>
+          <a:p>
+            <a:pPr lvl="1"/>
+            <a:r>
+              <a:rPr lang="en-US"/>
+              <a:t>Second level</a:t>
+            </a:r>
+          </a:p>
+          <a:p>
+            <a:pPr lvl="2"/>
+            <a:r>
+              <a:rPr lang="en-US"/>
+              <a:t>Third level</a:t>
+            </a:r>
+          </a:p>
+          <a:p>
+            <a:pPr lvl="3"/>
+            <a:r>
+              <a:rPr lang="en-US"/>
+              <a:t>Fourth level</a:t>
+            </a:r>
+          </a:p>
+          <a:p>
+            <a:pPr lvl="4"/>
+            <a:r>
+              <a:rPr lang="en-US"/>
+              <a:t>Fifth level</a:t>
+            </a:r>
+            <a:endParaRPr lang="en-GB"/>
+          </a:p>
+        </p:txBody>
+      </p:sp>
+      <p:sp>
+        <p:nvSpPr>
+          <p:cNvPr id="6" name="Footer Placeholder 5"/>
+          <p:cNvSpPr>
+            <a:spLocks noGrp="1"/>
+          </p:cNvSpPr>
+          <p:nvPr>
+            <p:ph type="ftr" sz="quarter" idx="4"/>
+          </p:nvPr>
+        </p:nvSpPr>
+        <p:spPr>
+          <a:xfrm>
+            <a:off x="0" y="8685213"/>
+            <a:ext cx="2971800" cy="458787"/>
+          </a:xfrm>
+          <a:prstGeom prst="rect">
+            <a:avLst/>
+          </a:prstGeom>
+        </p:spPr>
+        <p:txBody>
+          <a:bodyPr vert="horz" lIns="91440" tIns="45720" rIns="91440" bIns="45720" rtlCol="0" anchor="b"/>
+          <a:lstStyle>
+            <a:lvl1pPr algn="l">
+              <a:defRPr sz="1200"/>
+            </a:lvl1pPr>
+          </a:lstStyle>
+          <a:p>
+            <a:endParaRPr lang="en-GB"/>
+          </a:p>
+        </p:txBody>
+      </p:sp>
+      <p:sp>
+        <p:nvSpPr>
+          <p:cNvPr id="7" name="Slide Number Placeholder 6"/>
+          <p:cNvSpPr>
+            <a:spLocks noGrp="1"/>
+          </p:cNvSpPr>
+          <p:nvPr>
+            <p:ph type="sldNum" sz="quarter" idx="5"/>
+          </p:nvPr>
+        </p:nvSpPr>
+        <p:spPr>
+          <a:xfrm>
+            <a:off x="3884613" y="8685213"/>
+            <a:ext cx="2971800" cy="458787"/>
+          </a:xfrm>
+          <a:prstGeom prst="rect">
+            <a:avLst/>
+          </a:prstGeom>
+        </p:spPr>
+        <p:txBody>
+          <a:bodyPr vert="horz" lIns="91440" tIns="45720" rIns="91440" bIns="45720" rtlCol="0" anchor="b"/>
+          <a:lstStyle>
+            <a:lvl1pPr algn="r">
+              <a:defRPr sz="1200"/>
+            </a:lvl1pPr>
+          </a:lstStyle>
+          <a:p>
+            <a:fld id="{98714CD8-F1CB-4604-9BDB-C09DE26B3889}" type="slidenum">
+              <a:rPr lang="en-GB" smtClean="0"/>
+              <a:t>‹#›</a:t>
+            </a:fld>
+            <a:endParaRPr lang="en-GB"/>
+          </a:p>
+        </p:txBody>
+      </p:sp>
+    </p:spTree>
+    <p:extLst>
+      <p:ext uri="{BB962C8B-B14F-4D97-AF65-F5344CB8AC3E}">
+        <p14:creationId xmlns:p14="http://schemas.microsoft.com/office/powerpoint/2010/main" val="1692029995"/>
+      </p:ext>
+    </p:extLst>
+  </p:cSld>
+  <p:clrMap bg1="lt1" tx1="dk1" bg2="lt2" tx2="dk2" accent1="accent1" accent2="accent2" accent3="accent3" accent4="accent4" accent5="accent5" accent6="accent6" hlink="hlink" folHlink="folHlink"/>
+  <p:notesStyle>
+    <a:lvl1pPr marL="0" algn="l" defTabSz="914400" rtl="0" eaLnBrk="1" latinLnBrk="0" hangingPunct="1">
+      <a:defRPr sz="1200" kern="1200">
+        <a:solidFill>
+          <a:schemeClr val="tx1"/>
+        </a:solidFill>
+        <a:latin typeface="+mn-lt"/>
+        <a:ea typeface="+mn-ea"/>
+        <a:cs typeface="+mn-cs"/>
+      </a:defRPr>
+    </a:lvl1pPr>
+    <a:lvl2pPr marL="457200" algn="l" defTabSz="914400" rtl="0" eaLnBrk="1" latinLnBrk="0" hangingPunct="1">
+      <a:defRPr sz="1200" kern="1200">
+        <a:solidFill>
+          <a:schemeClr val="tx1"/>
+        </a:solidFill>
+        <a:latin typeface="+mn-lt"/>
+        <a:ea typeface="+mn-ea"/>
+        <a:cs typeface="+mn-cs"/>
+      </a:defRPr>
+    </a:lvl2pPr>
+    <a:lvl3pPr marL="914400" algn="l" defTabSz="914400" rtl="0" eaLnBrk="1" latinLnBrk="0" hangingPunct="1">
+      <a:defRPr sz="1200" kern="1200">
+        <a:solidFill>
+          <a:schemeClr val="tx1"/>
+        </a:solidFill>
+        <a:latin typeface="+mn-lt"/>
+        <a:ea typeface="+mn-ea"/>
+        <a:cs typeface="+mn-cs"/>
+      </a:defRPr>
+    </a:lvl3pPr>
+    <a:lvl4pPr marL="1371600" algn="l" defTabSz="914400" rtl="0" eaLnBrk="1" latinLnBrk="0" hangingPunct="1">
+      <a:defRPr sz="1200" kern="1200">
+        <a:solidFill>
+          <a:schemeClr val="tx1"/>
+        </a:solidFill>
+        <a:latin typeface="+mn-lt"/>
+        <a:ea typeface="+mn-ea"/>
+        <a:cs typeface="+mn-cs"/>
+      </a:defRPr>
+    </a:lvl4pPr>
+    <a:lvl5pPr marL="1828800" algn="l" defTabSz="914400" rtl="0" eaLnBrk="1" latinLnBrk="0" hangingPunct="1">
+      <a:defRPr sz="1200" kern="1200">
+        <a:solidFill>
+          <a:schemeClr val="tx1"/>
+        </a:solidFill>
+        <a:latin typeface="+mn-lt"/>
+        <a:ea typeface="+mn-ea"/>
+        <a:cs typeface="+mn-cs"/>
+      </a:defRPr>
+    </a:lvl5pPr>
+    <a:lvl6pPr marL="2286000" algn="l" defTabSz="914400" rtl="0" eaLnBrk="1" latinLnBrk="0" hangingPunct="1">
+      <a:defRPr sz="1200" kern="1200">
+        <a:solidFill>
+          <a:schemeClr val="tx1"/>
+        </a:solidFill>
+        <a:latin typeface="+mn-lt"/>
+        <a:ea typeface="+mn-ea"/>
+        <a:cs typeface="+mn-cs"/>
+      </a:defRPr>
+    </a:lvl6pPr>
+    <a:lvl7pPr marL="2743200" algn="l" defTabSz="914400" rtl="0" eaLnBrk="1" latinLnBrk="0" hangingPunct="1">
+      <a:defRPr sz="1200" kern="1200">
+        <a:solidFill>
+          <a:schemeClr val="tx1"/>
+        </a:solidFill>
+        <a:latin typeface="+mn-lt"/>
+        <a:ea typeface="+mn-ea"/>
+        <a:cs typeface="+mn-cs"/>
+      </a:defRPr>
+    </a:lvl7pPr>
+    <a:lvl8pPr marL="3200400" algn="l" defTabSz="914400" rtl="0" eaLnBrk="1" latinLnBrk="0" hangingPunct="1">
+      <a:defRPr sz="1200" kern="1200">
+        <a:solidFill>
+          <a:schemeClr val="tx1"/>
+        </a:solidFill>
+        <a:latin typeface="+mn-lt"/>
+        <a:ea typeface="+mn-ea"/>
+        <a:cs typeface="+mn-cs"/>
+      </a:defRPr>
+    </a:lvl8pPr>
+    <a:lvl9pPr marL="3657600" algn="l" defTabSz="914400" rtl="0" eaLnBrk="1" latinLnBrk="0" hangingPunct="1">
+      <a:defRPr sz="1200" kern="1200">
+        <a:solidFill>
+          <a:schemeClr val="tx1"/>
+        </a:solidFill>
+        <a:latin typeface="+mn-lt"/>
+        <a:ea typeface="+mn-ea"/>
+        <a:cs typeface="+mn-cs"/>
+      </a:defRPr>
+    </a:lvl9pPr>
+  </p:notesStyle>
+</p:notesMaster>
+</file>
+
+<file path=ppt/notesSlides/notesSlide1.xml><?xml version="1.0" encoding="utf-8"?>
+<p:notes xmlns:a="http://schemas.openxmlformats.org/drawingml/2006/main" xmlns:r="http://schemas.openxmlformats.org/officeDocument/2006/relationships" xmlns:p="http://schemas.openxmlformats.org/presentationml/2006/main">
+  <p:cSld>
+    <p:spTree>
+      <p:nvGrpSpPr>
+        <p:cNvPr id="1" name=""/>
+        <p:cNvGrpSpPr/>
+        <p:nvPr/>
+      </p:nvGrpSpPr>
+      <p:grpSpPr>
+        <a:xfrm>
+          <a:off x="0" y="0"/>
+          <a:ext cx="0" cy="0"/>
+          <a:chOff x="0" y="0"/>
+          <a:chExt cx="0" cy="0"/>
+        </a:xfrm>
+      </p:grpSpPr>
+      <p:sp>
+        <p:nvSpPr>
+          <p:cNvPr id="2" name="Slide Image Placeholder 1"/>
+          <p:cNvSpPr>
+            <a:spLocks noGrp="1" noRot="1" noChangeAspect="1"/>
+          </p:cNvSpPr>
+          <p:nvPr>
+            <p:ph type="sldImg"/>
+          </p:nvPr>
+        </p:nvSpPr>
+        <p:spPr/>
+      </p:sp>
+      <p:sp>
+        <p:nvSpPr>
+          <p:cNvPr id="3" name="Notes Placeholder 2"/>
+          <p:cNvSpPr>
+            <a:spLocks noGrp="1"/>
+          </p:cNvSpPr>
+          <p:nvPr>
+            <p:ph type="body" idx="1"/>
+          </p:nvPr>
+        </p:nvSpPr>
+        <p:spPr/>
+        <p:txBody>
+          <a:bodyPr/>
+          <a:lstStyle/>
+          <a:p>
+            <a:endParaRPr lang="en-GB" dirty="0"/>
+          </a:p>
+        </p:txBody>
+      </p:sp>
+      <p:sp>
+        <p:nvSpPr>
+          <p:cNvPr id="4" name="Slide Number Placeholder 3"/>
+          <p:cNvSpPr>
+            <a:spLocks noGrp="1"/>
+          </p:cNvSpPr>
+          <p:nvPr>
+            <p:ph type="sldNum" sz="quarter" idx="5"/>
+          </p:nvPr>
+        </p:nvSpPr>
+        <p:spPr/>
+        <p:txBody>
+          <a:bodyPr/>
+          <a:lstStyle/>
+          <a:p>
+            <a:fld id="{98714CD8-F1CB-4604-9BDB-C09DE26B3889}" type="slidenum">
+              <a:rPr lang="en-GB" smtClean="0"/>
+              <a:t>4</a:t>
+            </a:fld>
+            <a:endParaRPr lang="en-GB"/>
+          </a:p>
+        </p:txBody>
+      </p:sp>
+    </p:spTree>
+    <p:extLst>
+      <p:ext uri="{BB962C8B-B14F-4D97-AF65-F5344CB8AC3E}">
+        <p14:creationId xmlns:p14="http://schemas.microsoft.com/office/powerpoint/2010/main" val="809688367"/>
+      </p:ext>
+    </p:extLst>
+  </p:cSld>
+  <p:clrMapOvr>
+    <a:masterClrMapping/>
+  </p:clrMapOvr>
+</p:notes>
 </file>
 
 <file path=ppt/slideLayouts/slideLayout1.xml><?xml version="1.0" encoding="utf-8"?>
@@ -3596,6 +4037,18 @@
   <p:clrMapOvr>
     <a:masterClrMapping/>
   </p:clrMapOvr>
+  <mc:AlternateContent xmlns:mc="http://schemas.openxmlformats.org/markup-compatibility/2006">
+    <mc:Choice xmlns:p14="http://schemas.microsoft.com/office/powerpoint/2010/main" Requires="p14">
+      <p:transition spd="med" p14:dur="700">
+        <p:fade/>
+      </p:transition>
+    </mc:Choice>
+    <mc:Fallback>
+      <p:transition spd="med">
+        <p:fade/>
+      </p:transition>
+    </mc:Fallback>
+  </mc:AlternateContent>
 </p:sld>
 </file>
 
@@ -3671,27 +4124,17 @@
             </a:pPr>
             <a:r>
               <a:rPr lang="en-GB" dirty="0"/>
-              <a:t>I have a cup of coffee</a:t>
+              <a:t>Sometimes I add sugar to my coffee</a:t>
             </a:r>
           </a:p>
           <a:p>
             <a:pPr marL="514350" indent="-514350">
               <a:buFont typeface="+mj-lt"/>
-              <a:buAutoNum type="arabicPeriod"/>
+              <a:buAutoNum type="arabicPeriod" startAt="2"/>
             </a:pPr>
             <a:r>
               <a:rPr lang="en-GB" dirty="0"/>
-              <a:t>I have added sugar to the coffee</a:t>
-            </a:r>
-          </a:p>
-          <a:p>
-            <a:pPr marL="514350" indent="-514350">
-              <a:buFont typeface="+mj-lt"/>
-              <a:buAutoNum type="arabicPeriod"/>
-            </a:pPr>
-            <a:r>
-              <a:rPr lang="en-GB" dirty="0"/>
-              <a:t>I have stirred the coffee</a:t>
+              <a:t>Sometimes I stir my coffee</a:t>
             </a:r>
           </a:p>
         </p:txBody>
@@ -3731,6 +4174,173 @@
   <p:clrMapOvr>
     <a:masterClrMapping/>
   </p:clrMapOvr>
+  <mc:AlternateContent xmlns:mc="http://schemas.openxmlformats.org/markup-compatibility/2006">
+    <mc:Choice xmlns:p14="http://schemas.microsoft.com/office/powerpoint/2010/main" Requires="p14">
+      <p:transition spd="med" p14:dur="700">
+        <p:fade/>
+      </p:transition>
+    </mc:Choice>
+    <mc:Fallback>
+      <p:transition spd="med">
+        <p:fade/>
+      </p:transition>
+    </mc:Fallback>
+  </mc:AlternateContent>
+  <p:timing>
+    <p:tnLst>
+      <p:par>
+        <p:cTn id="1" dur="indefinite" restart="never" nodeType="tmRoot">
+          <p:childTnLst>
+            <p:seq concurrent="1" nextAc="seek">
+              <p:cTn id="2" dur="indefinite" nodeType="mainSeq">
+                <p:childTnLst>
+                  <p:par>
+                    <p:cTn id="3" fill="hold">
+                      <p:stCondLst>
+                        <p:cond delay="indefinite"/>
+                      </p:stCondLst>
+                      <p:childTnLst>
+                        <p:par>
+                          <p:cTn id="4" fill="hold">
+                            <p:stCondLst>
+                              <p:cond delay="0"/>
+                            </p:stCondLst>
+                            <p:childTnLst>
+                              <p:par>
+                                <p:cTn id="5" presetID="10" presetClass="entr" presetSubtype="0" fill="hold" grpId="0" nodeType="clickEffect">
+                                  <p:stCondLst>
+                                    <p:cond delay="0"/>
+                                  </p:stCondLst>
+                                  <p:childTnLst>
+                                    <p:set>
+                                      <p:cBhvr>
+                                        <p:cTn id="6" dur="1" fill="hold">
+                                          <p:stCondLst>
+                                            <p:cond delay="0"/>
+                                          </p:stCondLst>
+                                        </p:cTn>
+                                        <p:tgtEl>
+                                          <p:spTgt spid="3">
+                                            <p:txEl>
+                                              <p:pRg st="0" end="0"/>
+                                            </p:txEl>
+                                          </p:spTgt>
+                                        </p:tgtEl>
+                                        <p:attrNameLst>
+                                          <p:attrName>style.visibility</p:attrName>
+                                        </p:attrNameLst>
+                                      </p:cBhvr>
+                                      <p:to>
+                                        <p:strVal val="visible"/>
+                                      </p:to>
+                                    </p:set>
+                                    <p:animEffect transition="in" filter="fade">
+                                      <p:cBhvr>
+                                        <p:cTn id="7" dur="500"/>
+                                        <p:tgtEl>
+                                          <p:spTgt spid="3">
+                                            <p:txEl>
+                                              <p:pRg st="0" end="0"/>
+                                            </p:txEl>
+                                          </p:spTgt>
+                                        </p:tgtEl>
+                                      </p:cBhvr>
+                                    </p:animEffect>
+                                  </p:childTnLst>
+                                </p:cTn>
+                              </p:par>
+                            </p:childTnLst>
+                          </p:cTn>
+                        </p:par>
+                      </p:childTnLst>
+                    </p:cTn>
+                  </p:par>
+                  <p:par>
+                    <p:cTn id="8" fill="hold">
+                      <p:stCondLst>
+                        <p:cond delay="indefinite"/>
+                      </p:stCondLst>
+                      <p:childTnLst>
+                        <p:par>
+                          <p:cTn id="9" fill="hold">
+                            <p:stCondLst>
+                              <p:cond delay="0"/>
+                            </p:stCondLst>
+                            <p:childTnLst>
+                              <p:par>
+                                <p:cTn id="10" presetID="10" presetClass="entr" presetSubtype="0" fill="hold" grpId="0" nodeType="clickEffect">
+                                  <p:stCondLst>
+                                    <p:cond delay="0"/>
+                                  </p:stCondLst>
+                                  <p:childTnLst>
+                                    <p:set>
+                                      <p:cBhvr>
+                                        <p:cTn id="11" dur="1" fill="hold">
+                                          <p:stCondLst>
+                                            <p:cond delay="0"/>
+                                          </p:stCondLst>
+                                        </p:cTn>
+                                        <p:tgtEl>
+                                          <p:spTgt spid="3">
+                                            <p:txEl>
+                                              <p:pRg st="1" end="1"/>
+                                            </p:txEl>
+                                          </p:spTgt>
+                                        </p:tgtEl>
+                                        <p:attrNameLst>
+                                          <p:attrName>style.visibility</p:attrName>
+                                        </p:attrNameLst>
+                                      </p:cBhvr>
+                                      <p:to>
+                                        <p:strVal val="visible"/>
+                                      </p:to>
+                                    </p:set>
+                                    <p:animEffect transition="in" filter="fade">
+                                      <p:cBhvr>
+                                        <p:cTn id="12" dur="500"/>
+                                        <p:tgtEl>
+                                          <p:spTgt spid="3">
+                                            <p:txEl>
+                                              <p:pRg st="1" end="1"/>
+                                            </p:txEl>
+                                          </p:spTgt>
+                                        </p:tgtEl>
+                                      </p:cBhvr>
+                                    </p:animEffect>
+                                  </p:childTnLst>
+                                </p:cTn>
+                              </p:par>
+                            </p:childTnLst>
+                          </p:cTn>
+                        </p:par>
+                      </p:childTnLst>
+                    </p:cTn>
+                  </p:par>
+                </p:childTnLst>
+              </p:cTn>
+              <p:prevCondLst>
+                <p:cond evt="onPrev" delay="0">
+                  <p:tgtEl>
+                    <p:sldTgt/>
+                  </p:tgtEl>
+                </p:cond>
+              </p:prevCondLst>
+              <p:nextCondLst>
+                <p:cond evt="onNext" delay="0">
+                  <p:tgtEl>
+                    <p:sldTgt/>
+                  </p:tgtEl>
+                </p:cond>
+              </p:nextCondLst>
+            </p:seq>
+          </p:childTnLst>
+        </p:cTn>
+      </p:par>
+    </p:tnLst>
+    <p:bldLst>
+      <p:bldP spid="3" grpId="0" build="p"/>
+    </p:bldLst>
+  </p:timing>
 </p:sld>
 </file>
 
@@ -3800,21 +4410,40 @@
           <a:bodyPr/>
           <a:lstStyle/>
           <a:p>
+            <a:pPr marL="514350" indent="-514350">
+              <a:buFont typeface="+mj-lt"/>
+              <a:buAutoNum type="arabicPeriod"/>
+            </a:pPr>
             <a:r>
               <a:rPr lang="en-GB" dirty="0"/>
-              <a:t>To answer question you need to know both pieces of information</a:t>
+              <a:t>I have added sugar to my coffee</a:t>
             </a:r>
           </a:p>
           <a:p>
+            <a:pPr marL="0" indent="0">
+              <a:buNone/>
+            </a:pPr>
             <a:r>
               <a:rPr lang="en-GB" dirty="0"/>
-              <a:t>Need to appreciate that both need to occur</a:t>
+              <a:t>And </a:t>
             </a:r>
-          </a:p>
-          <a:p>
+            <a:r>
+              <a:rPr lang="en-GB" b="1" dirty="0">
+                <a:solidFill>
+                  <a:srgbClr val="FFFF00"/>
+                </a:solidFill>
+              </a:rPr>
+              <a:t>at the same time</a:t>
+            </a:r>
+          </a:p>
+          <a:p>
+            <a:pPr marL="514350" indent="-514350">
+              <a:buFont typeface="+mj-lt"/>
+              <a:buAutoNum type="arabicPeriod" startAt="2"/>
+            </a:pPr>
             <a:r>
               <a:rPr lang="en-GB" dirty="0"/>
-              <a:t>How do we tell the model this?</a:t>
+              <a:t>I have stirred the coffee</a:t>
             </a:r>
           </a:p>
         </p:txBody>
@@ -3847,6 +4476,364 @@
     </p:spTree>
     <p:extLst>
       <p:ext uri="{BB962C8B-B14F-4D97-AF65-F5344CB8AC3E}">
+        <p14:creationId xmlns:p14="http://schemas.microsoft.com/office/powerpoint/2010/main" val="2404485100"/>
+      </p:ext>
+    </p:extLst>
+  </p:cSld>
+  <p:clrMapOvr>
+    <a:masterClrMapping/>
+  </p:clrMapOvr>
+  <mc:AlternateContent xmlns:mc="http://schemas.openxmlformats.org/markup-compatibility/2006">
+    <mc:Choice xmlns:p14="http://schemas.microsoft.com/office/powerpoint/2010/main" Requires="p14">
+      <p:transition spd="med" p14:dur="700">
+        <p:fade/>
+      </p:transition>
+    </mc:Choice>
+    <mc:Fallback>
+      <p:transition spd="med">
+        <p:fade/>
+      </p:transition>
+    </mc:Fallback>
+  </mc:AlternateContent>
+  <p:timing>
+    <p:tnLst>
+      <p:par>
+        <p:cTn id="1" dur="indefinite" restart="never" nodeType="tmRoot">
+          <p:childTnLst>
+            <p:seq concurrent="1" nextAc="seek">
+              <p:cTn id="2" dur="indefinite" nodeType="mainSeq">
+                <p:childTnLst>
+                  <p:par>
+                    <p:cTn id="3" fill="hold">
+                      <p:stCondLst>
+                        <p:cond delay="indefinite"/>
+                      </p:stCondLst>
+                      <p:childTnLst>
+                        <p:par>
+                          <p:cTn id="4" fill="hold">
+                            <p:stCondLst>
+                              <p:cond delay="0"/>
+                            </p:stCondLst>
+                            <p:childTnLst>
+                              <p:par>
+                                <p:cTn id="5" presetID="10" presetClass="entr" presetSubtype="0" fill="hold" grpId="0" nodeType="clickEffect">
+                                  <p:stCondLst>
+                                    <p:cond delay="0"/>
+                                  </p:stCondLst>
+                                  <p:childTnLst>
+                                    <p:set>
+                                      <p:cBhvr>
+                                        <p:cTn id="6" dur="1" fill="hold">
+                                          <p:stCondLst>
+                                            <p:cond delay="0"/>
+                                          </p:stCondLst>
+                                        </p:cTn>
+                                        <p:tgtEl>
+                                          <p:spTgt spid="3">
+                                            <p:txEl>
+                                              <p:pRg st="0" end="0"/>
+                                            </p:txEl>
+                                          </p:spTgt>
+                                        </p:tgtEl>
+                                        <p:attrNameLst>
+                                          <p:attrName>style.visibility</p:attrName>
+                                        </p:attrNameLst>
+                                      </p:cBhvr>
+                                      <p:to>
+                                        <p:strVal val="visible"/>
+                                      </p:to>
+                                    </p:set>
+                                    <p:animEffect transition="in" filter="fade">
+                                      <p:cBhvr>
+                                        <p:cTn id="7" dur="500"/>
+                                        <p:tgtEl>
+                                          <p:spTgt spid="3">
+                                            <p:txEl>
+                                              <p:pRg st="0" end="0"/>
+                                            </p:txEl>
+                                          </p:spTgt>
+                                        </p:tgtEl>
+                                      </p:cBhvr>
+                                    </p:animEffect>
+                                  </p:childTnLst>
+                                </p:cTn>
+                              </p:par>
+                            </p:childTnLst>
+                          </p:cTn>
+                        </p:par>
+                      </p:childTnLst>
+                    </p:cTn>
+                  </p:par>
+                  <p:par>
+                    <p:cTn id="8" fill="hold">
+                      <p:stCondLst>
+                        <p:cond delay="indefinite"/>
+                      </p:stCondLst>
+                      <p:childTnLst>
+                        <p:par>
+                          <p:cTn id="9" fill="hold">
+                            <p:stCondLst>
+                              <p:cond delay="0"/>
+                            </p:stCondLst>
+                            <p:childTnLst>
+                              <p:par>
+                                <p:cTn id="10" presetID="10" presetClass="entr" presetSubtype="0" fill="hold" grpId="0" nodeType="clickEffect">
+                                  <p:stCondLst>
+                                    <p:cond delay="0"/>
+                                  </p:stCondLst>
+                                  <p:childTnLst>
+                                    <p:set>
+                                      <p:cBhvr>
+                                        <p:cTn id="11" dur="1" fill="hold">
+                                          <p:stCondLst>
+                                            <p:cond delay="0"/>
+                                          </p:stCondLst>
+                                        </p:cTn>
+                                        <p:tgtEl>
+                                          <p:spTgt spid="3">
+                                            <p:txEl>
+                                              <p:pRg st="1" end="1"/>
+                                            </p:txEl>
+                                          </p:spTgt>
+                                        </p:tgtEl>
+                                        <p:attrNameLst>
+                                          <p:attrName>style.visibility</p:attrName>
+                                        </p:attrNameLst>
+                                      </p:cBhvr>
+                                      <p:to>
+                                        <p:strVal val="visible"/>
+                                      </p:to>
+                                    </p:set>
+                                    <p:animEffect transition="in" filter="fade">
+                                      <p:cBhvr>
+                                        <p:cTn id="12" dur="500"/>
+                                        <p:tgtEl>
+                                          <p:spTgt spid="3">
+                                            <p:txEl>
+                                              <p:pRg st="1" end="1"/>
+                                            </p:txEl>
+                                          </p:spTgt>
+                                        </p:tgtEl>
+                                      </p:cBhvr>
+                                    </p:animEffect>
+                                  </p:childTnLst>
+                                </p:cTn>
+                              </p:par>
+                            </p:childTnLst>
+                          </p:cTn>
+                        </p:par>
+                      </p:childTnLst>
+                    </p:cTn>
+                  </p:par>
+                  <p:par>
+                    <p:cTn id="13" fill="hold">
+                      <p:stCondLst>
+                        <p:cond delay="indefinite"/>
+                      </p:stCondLst>
+                      <p:childTnLst>
+                        <p:par>
+                          <p:cTn id="14" fill="hold">
+                            <p:stCondLst>
+                              <p:cond delay="0"/>
+                            </p:stCondLst>
+                            <p:childTnLst>
+                              <p:par>
+                                <p:cTn id="15" presetID="10" presetClass="entr" presetSubtype="0" fill="hold" grpId="0" nodeType="clickEffect">
+                                  <p:stCondLst>
+                                    <p:cond delay="0"/>
+                                  </p:stCondLst>
+                                  <p:childTnLst>
+                                    <p:set>
+                                      <p:cBhvr>
+                                        <p:cTn id="16" dur="1" fill="hold">
+                                          <p:stCondLst>
+                                            <p:cond delay="0"/>
+                                          </p:stCondLst>
+                                        </p:cTn>
+                                        <p:tgtEl>
+                                          <p:spTgt spid="3">
+                                            <p:txEl>
+                                              <p:pRg st="2" end="2"/>
+                                            </p:txEl>
+                                          </p:spTgt>
+                                        </p:tgtEl>
+                                        <p:attrNameLst>
+                                          <p:attrName>style.visibility</p:attrName>
+                                        </p:attrNameLst>
+                                      </p:cBhvr>
+                                      <p:to>
+                                        <p:strVal val="visible"/>
+                                      </p:to>
+                                    </p:set>
+                                    <p:animEffect transition="in" filter="fade">
+                                      <p:cBhvr>
+                                        <p:cTn id="17" dur="500"/>
+                                        <p:tgtEl>
+                                          <p:spTgt spid="3">
+                                            <p:txEl>
+                                              <p:pRg st="2" end="2"/>
+                                            </p:txEl>
+                                          </p:spTgt>
+                                        </p:tgtEl>
+                                      </p:cBhvr>
+                                    </p:animEffect>
+                                  </p:childTnLst>
+                                </p:cTn>
+                              </p:par>
+                            </p:childTnLst>
+                          </p:cTn>
+                        </p:par>
+                      </p:childTnLst>
+                    </p:cTn>
+                  </p:par>
+                </p:childTnLst>
+              </p:cTn>
+              <p:prevCondLst>
+                <p:cond evt="onPrev" delay="0">
+                  <p:tgtEl>
+                    <p:sldTgt/>
+                  </p:tgtEl>
+                </p:cond>
+              </p:prevCondLst>
+              <p:nextCondLst>
+                <p:cond evt="onNext" delay="0">
+                  <p:tgtEl>
+                    <p:sldTgt/>
+                  </p:tgtEl>
+                </p:cond>
+              </p:nextCondLst>
+            </p:seq>
+          </p:childTnLst>
+        </p:cTn>
+      </p:par>
+    </p:tnLst>
+    <p:bldLst>
+      <p:bldP spid="3" grpId="0" build="p"/>
+    </p:bldLst>
+  </p:timing>
+</p:sld>
+</file>
+
+<file path=ppt/slides/slide12.xml><?xml version="1.0" encoding="utf-8"?>
+<p:sld xmlns:a="http://schemas.openxmlformats.org/drawingml/2006/main" xmlns:r="http://schemas.openxmlformats.org/officeDocument/2006/relationships" xmlns:p="http://schemas.openxmlformats.org/presentationml/2006/main">
+  <p:cSld>
+    <p:spTree>
+      <p:nvGrpSpPr>
+        <p:cNvPr id="1" name=""/>
+        <p:cNvGrpSpPr/>
+        <p:nvPr/>
+      </p:nvGrpSpPr>
+      <p:grpSpPr>
+        <a:xfrm>
+          <a:off x="0" y="0"/>
+          <a:ext cx="0" cy="0"/>
+          <a:chOff x="0" y="0"/>
+          <a:chExt cx="0" cy="0"/>
+        </a:xfrm>
+      </p:grpSpPr>
+      <p:sp>
+        <p:nvSpPr>
+          <p:cNvPr id="2" name="Title 1">
+            <a:extLst>
+              <a:ext uri="{FF2B5EF4-FFF2-40B4-BE49-F238E27FC236}">
+                <a16:creationId xmlns:a16="http://schemas.microsoft.com/office/drawing/2014/main" id="{94207DF2-8981-6110-14AC-61101BD9B34E}"/>
+              </a:ext>
+            </a:extLst>
+          </p:cNvPr>
+          <p:cNvSpPr>
+            <a:spLocks noGrp="1"/>
+          </p:cNvSpPr>
+          <p:nvPr>
+            <p:ph type="title"/>
+          </p:nvPr>
+        </p:nvSpPr>
+        <p:spPr/>
+        <p:txBody>
+          <a:bodyPr/>
+          <a:lstStyle/>
+          <a:p>
+            <a:r>
+              <a:rPr lang="en-GB" dirty="0"/>
+              <a:t>Is my coffee sweet?</a:t>
+            </a:r>
+          </a:p>
+        </p:txBody>
+      </p:sp>
+      <p:sp>
+        <p:nvSpPr>
+          <p:cNvPr id="3" name="Content Placeholder 2">
+            <a:extLst>
+              <a:ext uri="{FF2B5EF4-FFF2-40B4-BE49-F238E27FC236}">
+                <a16:creationId xmlns:a16="http://schemas.microsoft.com/office/drawing/2014/main" id="{8D680C27-FFFD-52F6-9961-11CF916FE205}"/>
+              </a:ext>
+            </a:extLst>
+          </p:cNvPr>
+          <p:cNvSpPr>
+            <a:spLocks noGrp="1"/>
+          </p:cNvSpPr>
+          <p:nvPr>
+            <p:ph idx="1"/>
+          </p:nvPr>
+        </p:nvSpPr>
+        <p:spPr/>
+        <p:txBody>
+          <a:bodyPr/>
+          <a:lstStyle/>
+          <a:p>
+            <a:r>
+              <a:rPr lang="en-GB" dirty="0"/>
+              <a:t>To answer question you need to know both pieces of information</a:t>
+            </a:r>
+          </a:p>
+          <a:p>
+            <a:pPr lvl="1"/>
+            <a:r>
+              <a:rPr lang="en-GB" dirty="0"/>
+              <a:t>But just knowing that sometimes I stir and sometimes I add sugar doesn’t actually help very much</a:t>
+            </a:r>
+          </a:p>
+          <a:p>
+            <a:r>
+              <a:rPr lang="en-GB" dirty="0"/>
+              <a:t>We need to know if both adding sugar and stirring occurred at the same time</a:t>
+            </a:r>
+          </a:p>
+          <a:p>
+            <a:r>
+              <a:rPr lang="en-GB" dirty="0"/>
+              <a:t>How do we tell the model this?</a:t>
+            </a:r>
+          </a:p>
+        </p:txBody>
+      </p:sp>
+      <p:sp>
+        <p:nvSpPr>
+          <p:cNvPr id="4" name="Picture Placeholder 3">
+            <a:extLst>
+              <a:ext uri="{FF2B5EF4-FFF2-40B4-BE49-F238E27FC236}">
+                <a16:creationId xmlns:a16="http://schemas.microsoft.com/office/drawing/2014/main" id="{A8A1178C-90B4-6BC1-B81A-5E95D2E9B3A7}"/>
+              </a:ext>
+            </a:extLst>
+          </p:cNvPr>
+          <p:cNvSpPr>
+            <a:spLocks noGrp="1"/>
+          </p:cNvSpPr>
+          <p:nvPr>
+            <p:ph type="pic" sz="quarter" idx="10"/>
+          </p:nvPr>
+        </p:nvSpPr>
+        <p:spPr/>
+        <p:txBody>
+          <a:bodyPr/>
+          <a:lstStyle/>
+          <a:p>
+            <a:endParaRPr lang="en-GB"/>
+          </a:p>
+        </p:txBody>
+      </p:sp>
+    </p:spTree>
+    <p:extLst>
+      <p:ext uri="{BB962C8B-B14F-4D97-AF65-F5344CB8AC3E}">
         <p14:creationId xmlns:p14="http://schemas.microsoft.com/office/powerpoint/2010/main" val="2072223426"/>
       </p:ext>
     </p:extLst>
@@ -3854,10 +4841,299 @@
   <p:clrMapOvr>
     <a:masterClrMapping/>
   </p:clrMapOvr>
+  <mc:AlternateContent xmlns:mc="http://schemas.openxmlformats.org/markup-compatibility/2006">
+    <mc:Choice xmlns:p14="http://schemas.microsoft.com/office/powerpoint/2010/main" Requires="p14">
+      <p:transition spd="med" p14:dur="700">
+        <p:fade/>
+      </p:transition>
+    </mc:Choice>
+    <mc:Fallback>
+      <p:transition spd="med">
+        <p:fade/>
+      </p:transition>
+    </mc:Fallback>
+  </mc:AlternateContent>
+  <p:timing>
+    <p:tnLst>
+      <p:par>
+        <p:cTn id="1" dur="indefinite" restart="never" nodeType="tmRoot">
+          <p:childTnLst>
+            <p:seq concurrent="1" nextAc="seek">
+              <p:cTn id="2" dur="indefinite" nodeType="mainSeq">
+                <p:childTnLst>
+                  <p:par>
+                    <p:cTn id="3" fill="hold">
+                      <p:stCondLst>
+                        <p:cond delay="indefinite"/>
+                      </p:stCondLst>
+                      <p:childTnLst>
+                        <p:par>
+                          <p:cTn id="4" fill="hold">
+                            <p:stCondLst>
+                              <p:cond delay="0"/>
+                            </p:stCondLst>
+                            <p:childTnLst>
+                              <p:par>
+                                <p:cTn id="5" presetID="10" presetClass="entr" presetSubtype="0" fill="hold" grpId="0" nodeType="clickEffect">
+                                  <p:stCondLst>
+                                    <p:cond delay="0"/>
+                                  </p:stCondLst>
+                                  <p:childTnLst>
+                                    <p:set>
+                                      <p:cBhvr>
+                                        <p:cTn id="6" dur="1" fill="hold">
+                                          <p:stCondLst>
+                                            <p:cond delay="0"/>
+                                          </p:stCondLst>
+                                        </p:cTn>
+                                        <p:tgtEl>
+                                          <p:spTgt spid="3">
+                                            <p:txEl>
+                                              <p:pRg st="0" end="0"/>
+                                            </p:txEl>
+                                          </p:spTgt>
+                                        </p:tgtEl>
+                                        <p:attrNameLst>
+                                          <p:attrName>style.visibility</p:attrName>
+                                        </p:attrNameLst>
+                                      </p:cBhvr>
+                                      <p:to>
+                                        <p:strVal val="visible"/>
+                                      </p:to>
+                                    </p:set>
+                                    <p:animEffect transition="in" filter="fade">
+                                      <p:cBhvr>
+                                        <p:cTn id="7" dur="500"/>
+                                        <p:tgtEl>
+                                          <p:spTgt spid="3">
+                                            <p:txEl>
+                                              <p:pRg st="0" end="0"/>
+                                            </p:txEl>
+                                          </p:spTgt>
+                                        </p:tgtEl>
+                                      </p:cBhvr>
+                                    </p:animEffect>
+                                  </p:childTnLst>
+                                </p:cTn>
+                              </p:par>
+                            </p:childTnLst>
+                          </p:cTn>
+                        </p:par>
+                      </p:childTnLst>
+                    </p:cTn>
+                  </p:par>
+                  <p:par>
+                    <p:cTn id="8" fill="hold">
+                      <p:stCondLst>
+                        <p:cond delay="indefinite"/>
+                      </p:stCondLst>
+                      <p:childTnLst>
+                        <p:par>
+                          <p:cTn id="9" fill="hold">
+                            <p:stCondLst>
+                              <p:cond delay="0"/>
+                            </p:stCondLst>
+                            <p:childTnLst>
+                              <p:par>
+                                <p:cTn id="10" presetID="10" presetClass="entr" presetSubtype="0" fill="hold" grpId="0" nodeType="clickEffect">
+                                  <p:stCondLst>
+                                    <p:cond delay="0"/>
+                                  </p:stCondLst>
+                                  <p:childTnLst>
+                                    <p:set>
+                                      <p:cBhvr>
+                                        <p:cTn id="11" dur="1" fill="hold">
+                                          <p:stCondLst>
+                                            <p:cond delay="0"/>
+                                          </p:stCondLst>
+                                        </p:cTn>
+                                        <p:tgtEl>
+                                          <p:spTgt spid="3">
+                                            <p:txEl>
+                                              <p:pRg st="1" end="1"/>
+                                            </p:txEl>
+                                          </p:spTgt>
+                                        </p:tgtEl>
+                                        <p:attrNameLst>
+                                          <p:attrName>style.visibility</p:attrName>
+                                        </p:attrNameLst>
+                                      </p:cBhvr>
+                                      <p:to>
+                                        <p:strVal val="visible"/>
+                                      </p:to>
+                                    </p:set>
+                                    <p:animEffect transition="in" filter="fade">
+                                      <p:cBhvr>
+                                        <p:cTn id="12" dur="500"/>
+                                        <p:tgtEl>
+                                          <p:spTgt spid="3">
+                                            <p:txEl>
+                                              <p:pRg st="1" end="1"/>
+                                            </p:txEl>
+                                          </p:spTgt>
+                                        </p:tgtEl>
+                                      </p:cBhvr>
+                                    </p:animEffect>
+                                  </p:childTnLst>
+                                </p:cTn>
+                              </p:par>
+                            </p:childTnLst>
+                          </p:cTn>
+                        </p:par>
+                      </p:childTnLst>
+                    </p:cTn>
+                  </p:par>
+                  <p:par>
+                    <p:cTn id="13" fill="hold">
+                      <p:stCondLst>
+                        <p:cond delay="indefinite"/>
+                      </p:stCondLst>
+                      <p:childTnLst>
+                        <p:par>
+                          <p:cTn id="14" fill="hold">
+                            <p:stCondLst>
+                              <p:cond delay="0"/>
+                            </p:stCondLst>
+                            <p:childTnLst>
+                              <p:par>
+                                <p:cTn id="15" presetID="10" presetClass="entr" presetSubtype="0" fill="hold" grpId="0" nodeType="clickEffect">
+                                  <p:stCondLst>
+                                    <p:cond delay="0"/>
+                                  </p:stCondLst>
+                                  <p:childTnLst>
+                                    <p:set>
+                                      <p:cBhvr>
+                                        <p:cTn id="16" dur="1" fill="hold">
+                                          <p:stCondLst>
+                                            <p:cond delay="0"/>
+                                          </p:stCondLst>
+                                        </p:cTn>
+                                        <p:tgtEl>
+                                          <p:spTgt spid="3">
+                                            <p:txEl>
+                                              <p:pRg st="2" end="2"/>
+                                            </p:txEl>
+                                          </p:spTgt>
+                                        </p:tgtEl>
+                                        <p:attrNameLst>
+                                          <p:attrName>style.visibility</p:attrName>
+                                        </p:attrNameLst>
+                                      </p:cBhvr>
+                                      <p:to>
+                                        <p:strVal val="visible"/>
+                                      </p:to>
+                                    </p:set>
+                                    <p:animEffect transition="in" filter="fade">
+                                      <p:cBhvr>
+                                        <p:cTn id="17" dur="500"/>
+                                        <p:tgtEl>
+                                          <p:spTgt spid="3">
+                                            <p:txEl>
+                                              <p:pRg st="2" end="2"/>
+                                            </p:txEl>
+                                          </p:spTgt>
+                                        </p:tgtEl>
+                                      </p:cBhvr>
+                                    </p:animEffect>
+                                  </p:childTnLst>
+                                </p:cTn>
+                              </p:par>
+                            </p:childTnLst>
+                          </p:cTn>
+                        </p:par>
+                      </p:childTnLst>
+                    </p:cTn>
+                  </p:par>
+                  <p:par>
+                    <p:cTn id="18" fill="hold">
+                      <p:stCondLst>
+                        <p:cond delay="indefinite"/>
+                      </p:stCondLst>
+                      <p:childTnLst>
+                        <p:par>
+                          <p:cTn id="19" fill="hold">
+                            <p:stCondLst>
+                              <p:cond delay="0"/>
+                            </p:stCondLst>
+                            <p:childTnLst>
+                              <p:par>
+                                <p:cTn id="20" presetID="10" presetClass="entr" presetSubtype="0" fill="hold" grpId="0" nodeType="clickEffect">
+                                  <p:stCondLst>
+                                    <p:cond delay="0"/>
+                                  </p:stCondLst>
+                                  <p:childTnLst>
+                                    <p:set>
+                                      <p:cBhvr>
+                                        <p:cTn id="21" dur="1" fill="hold">
+                                          <p:stCondLst>
+                                            <p:cond delay="0"/>
+                                          </p:stCondLst>
+                                        </p:cTn>
+                                        <p:tgtEl>
+                                          <p:spTgt spid="3">
+                                            <p:txEl>
+                                              <p:pRg st="3" end="3"/>
+                                            </p:txEl>
+                                          </p:spTgt>
+                                        </p:tgtEl>
+                                        <p:attrNameLst>
+                                          <p:attrName>style.visibility</p:attrName>
+                                        </p:attrNameLst>
+                                      </p:cBhvr>
+                                      <p:to>
+                                        <p:strVal val="visible"/>
+                                      </p:to>
+                                    </p:set>
+                                    <p:animEffect transition="in" filter="fade">
+                                      <p:cBhvr>
+                                        <p:cTn id="22" dur="500"/>
+                                        <p:tgtEl>
+                                          <p:spTgt spid="3">
+                                            <p:txEl>
+                                              <p:pRg st="3" end="3"/>
+                                            </p:txEl>
+                                          </p:spTgt>
+                                        </p:tgtEl>
+                                      </p:cBhvr>
+                                    </p:animEffect>
+                                  </p:childTnLst>
+                                </p:cTn>
+                              </p:par>
+                            </p:childTnLst>
+                          </p:cTn>
+                        </p:par>
+                      </p:childTnLst>
+                    </p:cTn>
+                  </p:par>
+                </p:childTnLst>
+              </p:cTn>
+              <p:prevCondLst>
+                <p:cond evt="onPrev" delay="0">
+                  <p:tgtEl>
+                    <p:sldTgt/>
+                  </p:tgtEl>
+                </p:cond>
+              </p:prevCondLst>
+              <p:nextCondLst>
+                <p:cond evt="onNext" delay="0">
+                  <p:tgtEl>
+                    <p:sldTgt/>
+                  </p:tgtEl>
+                </p:cond>
+              </p:nextCondLst>
+            </p:seq>
+          </p:childTnLst>
+        </p:cTn>
+      </p:par>
+    </p:tnLst>
+    <p:bldLst>
+      <p:bldP spid="3" grpId="0" uiExpand="1" build="p"/>
+    </p:bldLst>
+  </p:timing>
 </p:sld>
 </file>
 
-<file path=ppt/slides/slide12.xml><?xml version="1.0" encoding="utf-8"?>
+<file path=ppt/slides/slide13.xml><?xml version="1.0" encoding="utf-8"?>
 <p:sld xmlns:a="http://schemas.openxmlformats.org/drawingml/2006/main" xmlns:r="http://schemas.openxmlformats.org/officeDocument/2006/relationships" xmlns:p="http://schemas.openxmlformats.org/presentationml/2006/main">
   <p:cSld>
     <p:spTree>
@@ -3912,8 +5188,9 @@
             <a:r>
               <a:rPr lang="en-GB" sz="5400" dirty="0">
                 <a:latin typeface="Bahnschrift Light" panose="020B0502040204020203" pitchFamily="34" charset="0"/>
+                <a:cs typeface="Courier New" panose="02070309020205020404" pitchFamily="49" charset="0"/>
               </a:rPr>
-              <a:t>Main effects</a:t>
+              <a:t>What is an interaction?</a:t>
             </a:r>
             <a:endParaRPr lang="en-GB" sz="5400" dirty="0">
               <a:latin typeface="Courier New" panose="02070309020205020404" pitchFamily="49" charset="0"/>
@@ -5039,13 +6316,13 @@
   <p:clrMapOvr>
     <a:masterClrMapping/>
   </p:clrMapOvr>
-  <mc:AlternateContent xmlns:mc="http://schemas.openxmlformats.org/markup-compatibility/2006" xmlns:p14="http://schemas.microsoft.com/office/powerpoint/2010/main">
-    <mc:Choice Requires="p14">
+  <mc:AlternateContent xmlns:mc="http://schemas.openxmlformats.org/markup-compatibility/2006">
+    <mc:Choice xmlns:p14="http://schemas.microsoft.com/office/powerpoint/2010/main" Requires="p14">
       <p:transition spd="med" p14:dur="700">
         <p:fade/>
       </p:transition>
     </mc:Choice>
-    <mc:Fallback xmlns="">
+    <mc:Fallback>
       <p:transition spd="med">
         <p:fade/>
       </p:transition>
@@ -5462,7 +6739,7 @@
 </p:sld>
 </file>
 
-<file path=ppt/slides/slide13.xml><?xml version="1.0" encoding="utf-8"?>
+<file path=ppt/slides/slide14.xml><?xml version="1.0" encoding="utf-8"?>
 <p:sld xmlns:a="http://schemas.openxmlformats.org/drawingml/2006/main" xmlns:r="http://schemas.openxmlformats.org/officeDocument/2006/relationships" xmlns:p="http://schemas.openxmlformats.org/presentationml/2006/main">
   <p:cSld>
     <p:spTree>
@@ -6189,13 +7466,13 @@
   <p:clrMapOvr>
     <a:masterClrMapping/>
   </p:clrMapOvr>
-  <mc:AlternateContent xmlns:mc="http://schemas.openxmlformats.org/markup-compatibility/2006" xmlns:p14="http://schemas.microsoft.com/office/powerpoint/2010/main">
-    <mc:Choice Requires="p14">
+  <mc:AlternateContent xmlns:mc="http://schemas.openxmlformats.org/markup-compatibility/2006">
+    <mc:Choice xmlns:p14="http://schemas.microsoft.com/office/powerpoint/2010/main" Requires="p14">
       <p:transition spd="med" p14:dur="700">
         <p:fade/>
       </p:transition>
     </mc:Choice>
-    <mc:Fallback xmlns="">
+    <mc:Fallback>
       <p:transition spd="med">
         <p:fade/>
       </p:transition>
@@ -6437,7 +7714,7 @@
 </p:sld>
 </file>
 
-<file path=ppt/slides/slide14.xml><?xml version="1.0" encoding="utf-8"?>
+<file path=ppt/slides/slide15.xml><?xml version="1.0" encoding="utf-8"?>
 <p:sld xmlns:a="http://schemas.openxmlformats.org/drawingml/2006/main" xmlns:r="http://schemas.openxmlformats.org/officeDocument/2006/relationships" xmlns:p="http://schemas.openxmlformats.org/presentationml/2006/main">
   <p:cSld>
     <p:spTree>
@@ -6502,8 +7779,8 @@
           </a:p>
         </p:txBody>
       </p:sp>
-      <mc:AlternateContent xmlns:mc="http://schemas.openxmlformats.org/markup-compatibility/2006">
-        <mc:Choice xmlns:a14="http://schemas.microsoft.com/office/drawing/2010/main" Requires="a14">
+      <mc:AlternateContent xmlns:mc="http://schemas.openxmlformats.org/markup-compatibility/2006" xmlns:a14="http://schemas.microsoft.com/office/drawing/2010/main">
+        <mc:Choice Requires="a14">
           <p:sp>
             <p:nvSpPr>
               <p:cNvPr id="7" name="Content Placeholder 6">
@@ -7292,13 +8569,7 @@
                       <a:rPr lang="en-GB" i="1">
                         <a:latin typeface="Cambria Math" panose="02040503050406030204" pitchFamily="18" charset="0"/>
                       </a:rPr>
-                      <m:t>+</m:t>
-                    </m:r>
-                    <m:r>
-                      <a:rPr lang="en-GB" i="1">
-                        <a:latin typeface="Cambria Math" panose="02040503050406030204" pitchFamily="18" charset="0"/>
-                      </a:rPr>
-                      <m:t> </m:t>
+                      <m:t>+ </m:t>
                     </m:r>
                     <m:sSub>
                       <m:sSubPr>
@@ -7415,7 +8686,7 @@
             </p:txBody>
           </p:sp>
         </mc:Choice>
-        <mc:Fallback>
+        <mc:Fallback xmlns="">
           <p:sp>
             <p:nvSpPr>
               <p:cNvPr id="7" name="Content Placeholder 6">
@@ -7529,13 +8800,13 @@
   <p:clrMapOvr>
     <a:masterClrMapping/>
   </p:clrMapOvr>
-  <mc:AlternateContent xmlns:mc="http://schemas.openxmlformats.org/markup-compatibility/2006" xmlns:p14="http://schemas.microsoft.com/office/powerpoint/2010/main">
-    <mc:Choice Requires="p14">
+  <mc:AlternateContent xmlns:mc="http://schemas.openxmlformats.org/markup-compatibility/2006">
+    <mc:Choice xmlns:p14="http://schemas.microsoft.com/office/powerpoint/2010/main" Requires="p14">
       <p:transition spd="med" p14:dur="700">
         <p:fade/>
       </p:transition>
     </mc:Choice>
-    <mc:Fallback xmlns="">
+    <mc:Fallback>
       <p:transition spd="med">
         <p:fade/>
       </p:transition>
@@ -7734,7 +9005,7 @@
                                         <p:tgtEl>
                                           <p:spTgt spid="7">
                                             <p:txEl>
-                                              <p:pRg st="2" end="2"/>
+                                              <p:pRg st="3" end="3"/>
                                             </p:txEl>
                                           </p:spTgt>
                                         </p:tgtEl>
@@ -7752,7 +9023,7 @@
                                         <p:tgtEl>
                                           <p:spTgt spid="7">
                                             <p:txEl>
-                                              <p:pRg st="2" end="2"/>
+                                              <p:pRg st="3" end="3"/>
                                             </p:txEl>
                                           </p:spTgt>
                                         </p:tgtEl>
@@ -7795,7 +9066,7 @@
                                         <p:tgtEl>
                                           <p:spTgt spid="7">
                                             <p:txEl>
-                                              <p:pRg st="3" end="3"/>
+                                              <p:pRg st="2" end="2"/>
                                             </p:txEl>
                                           </p:spTgt>
                                         </p:tgtEl>
@@ -7813,7 +9084,7 @@
                                         <p:tgtEl>
                                           <p:spTgt spid="7">
                                             <p:txEl>
-                                              <p:pRg st="3" end="3"/>
+                                              <p:pRg st="2" end="2"/>
                                             </p:txEl>
                                           </p:spTgt>
                                         </p:tgtEl>
@@ -8142,6 +9413,1089 @@
 </p:sld>
 </file>
 
+<file path=ppt/slides/slide16.xml><?xml version="1.0" encoding="utf-8"?>
+<p:sld xmlns:a="http://schemas.openxmlformats.org/drawingml/2006/main" xmlns:r="http://schemas.openxmlformats.org/officeDocument/2006/relationships" xmlns:p="http://schemas.openxmlformats.org/presentationml/2006/main">
+  <p:cSld>
+    <p:spTree>
+      <p:nvGrpSpPr>
+        <p:cNvPr id="1" name=""/>
+        <p:cNvGrpSpPr/>
+        <p:nvPr/>
+      </p:nvGrpSpPr>
+      <p:grpSpPr>
+        <a:xfrm>
+          <a:off x="0" y="0"/>
+          <a:ext cx="0" cy="0"/>
+          <a:chOff x="0" y="0"/>
+          <a:chExt cx="0" cy="0"/>
+        </a:xfrm>
+      </p:grpSpPr>
+      <mc:AlternateContent xmlns:mc="http://schemas.openxmlformats.org/markup-compatibility/2006" xmlns:a14="http://schemas.microsoft.com/office/drawing/2010/main">
+        <mc:Choice Requires="a14">
+          <p:sp>
+            <p:nvSpPr>
+              <p:cNvPr id="2" name="Title 1">
+                <a:extLst>
+                  <a:ext uri="{FF2B5EF4-FFF2-40B4-BE49-F238E27FC236}">
+                    <a16:creationId xmlns:a16="http://schemas.microsoft.com/office/drawing/2014/main" id="{18D323C9-826F-36C8-34D6-8139DBA87DFA}"/>
+                  </a:ext>
+                </a:extLst>
+              </p:cNvPr>
+              <p:cNvSpPr>
+                <a:spLocks noGrp="1"/>
+              </p:cNvSpPr>
+              <p:nvPr>
+                <p:ph type="title"/>
+              </p:nvPr>
+            </p:nvSpPr>
+            <p:spPr/>
+            <p:txBody>
+              <a:bodyPr/>
+              <a:lstStyle/>
+              <a:p>
+                <a:r>
+                  <a:rPr lang="en-GB" dirty="0"/>
+                  <a:t>How do we say 1 rat </a:t>
+                </a:r>
+                <a14:m>
+                  <m:oMath xmlns:m="http://schemas.openxmlformats.org/officeDocument/2006/math">
+                    <m:r>
+                      <a:rPr lang="en-GB" b="0" i="1" smtClean="0">
+                        <a:latin typeface="Cambria Math" panose="02040503050406030204" pitchFamily="18" charset="0"/>
+                      </a:rPr>
+                      <m:t>≠</m:t>
+                    </m:r>
+                  </m:oMath>
+                </a14:m>
+                <a:r>
+                  <a:rPr lang="en-GB" dirty="0"/>
+                  <a:t> 1 boar?</a:t>
+                </a:r>
+              </a:p>
+            </p:txBody>
+          </p:sp>
+        </mc:Choice>
+        <mc:Fallback xmlns="">
+          <p:sp>
+            <p:nvSpPr>
+              <p:cNvPr id="2" name="Title 1">
+                <a:extLst>
+                  <a:ext uri="{FF2B5EF4-FFF2-40B4-BE49-F238E27FC236}">
+                    <a16:creationId xmlns:a16="http://schemas.microsoft.com/office/drawing/2014/main" id="{18D323C9-826F-36C8-34D6-8139DBA87DFA}"/>
+                  </a:ext>
+                </a:extLst>
+              </p:cNvPr>
+              <p:cNvSpPr>
+                <a:spLocks noGrp="1" noRot="1" noChangeAspect="1" noMove="1" noResize="1" noEditPoints="1" noAdjustHandles="1" noChangeArrowheads="1" noChangeShapeType="1" noTextEdit="1"/>
+              </p:cNvSpPr>
+              <p:nvPr>
+                <p:ph type="title"/>
+              </p:nvPr>
+            </p:nvSpPr>
+            <p:spPr>
+              <a:blipFill>
+                <a:blip r:embed="rId2"/>
+                <a:stretch>
+                  <a:fillRect l="-3478" r="-2899" b="-22917"/>
+                </a:stretch>
+              </a:blipFill>
+            </p:spPr>
+            <p:txBody>
+              <a:bodyPr/>
+              <a:lstStyle/>
+              <a:p>
+                <a:r>
+                  <a:rPr lang="en-GB">
+                    <a:noFill/>
+                  </a:rPr>
+                  <a:t> </a:t>
+                </a:r>
+              </a:p>
+            </p:txBody>
+          </p:sp>
+        </mc:Fallback>
+      </mc:AlternateContent>
+    </p:spTree>
+    <p:extLst>
+      <p:ext uri="{BB962C8B-B14F-4D97-AF65-F5344CB8AC3E}">
+        <p14:creationId xmlns:p14="http://schemas.microsoft.com/office/powerpoint/2010/main" val="2491388174"/>
+      </p:ext>
+    </p:extLst>
+  </p:cSld>
+  <p:clrMapOvr>
+    <a:masterClrMapping/>
+  </p:clrMapOvr>
+  <mc:AlternateContent xmlns:mc="http://schemas.openxmlformats.org/markup-compatibility/2006">
+    <mc:Choice xmlns:p14="http://schemas.microsoft.com/office/powerpoint/2010/main" Requires="p14">
+      <p:transition spd="med" p14:dur="700">
+        <p:fade/>
+      </p:transition>
+    </mc:Choice>
+    <mc:Fallback>
+      <p:transition spd="med">
+        <p:fade/>
+      </p:transition>
+    </mc:Fallback>
+  </mc:AlternateContent>
+</p:sld>
+</file>
+
+<file path=ppt/slides/slide17.xml><?xml version="1.0" encoding="utf-8"?>
+<p:sld xmlns:a="http://schemas.openxmlformats.org/drawingml/2006/main" xmlns:r="http://schemas.openxmlformats.org/officeDocument/2006/relationships" xmlns:p="http://schemas.openxmlformats.org/presentationml/2006/main">
+  <p:cSld>
+    <p:spTree>
+      <p:nvGrpSpPr>
+        <p:cNvPr id="1" name=""/>
+        <p:cNvGrpSpPr/>
+        <p:nvPr/>
+      </p:nvGrpSpPr>
+      <p:grpSpPr>
+        <a:xfrm>
+          <a:off x="0" y="0"/>
+          <a:ext cx="0" cy="0"/>
+          <a:chOff x="0" y="0"/>
+          <a:chExt cx="0" cy="0"/>
+        </a:xfrm>
+      </p:grpSpPr>
+      <p:grpSp>
+        <p:nvGrpSpPr>
+          <p:cNvPr id="11" name="Group 10">
+            <a:extLst>
+              <a:ext uri="{FF2B5EF4-FFF2-40B4-BE49-F238E27FC236}">
+                <a16:creationId xmlns:a16="http://schemas.microsoft.com/office/drawing/2014/main" id="{5EF2B03B-9098-3C5E-AACF-8690EAEF6D2D}"/>
+              </a:ext>
+            </a:extLst>
+          </p:cNvPr>
+          <p:cNvGrpSpPr/>
+          <p:nvPr/>
+        </p:nvGrpSpPr>
+        <p:grpSpPr>
+          <a:xfrm>
+            <a:off x="3202959" y="1605307"/>
+            <a:ext cx="4416022" cy="3982392"/>
+            <a:chOff x="5855624" y="1578147"/>
+            <a:chExt cx="4416022" cy="3982392"/>
+          </a:xfrm>
+        </p:grpSpPr>
+        <p:sp>
+          <p:nvSpPr>
+            <p:cNvPr id="2" name="TextBox 1">
+              <a:extLst>
+                <a:ext uri="{FF2B5EF4-FFF2-40B4-BE49-F238E27FC236}">
+                  <a16:creationId xmlns:a16="http://schemas.microsoft.com/office/drawing/2014/main" id="{6E4E91E1-927F-A38B-ED3D-D07C7B64587E}"/>
+                </a:ext>
+              </a:extLst>
+            </p:cNvPr>
+            <p:cNvSpPr txBox="1"/>
+            <p:nvPr/>
+          </p:nvSpPr>
+          <p:spPr>
+            <a:xfrm>
+              <a:off x="8975073" y="2915215"/>
+              <a:ext cx="1296573" cy="1168539"/>
+            </a:xfrm>
+            <a:prstGeom prst="ellipse">
+              <a:avLst/>
+            </a:prstGeom>
+            <a:solidFill>
+              <a:schemeClr val="tx2">
+                <a:lumMod val="10000"/>
+              </a:schemeClr>
+            </a:solidFill>
+            <a:ln>
+              <a:solidFill>
+                <a:schemeClr val="tx1"/>
+              </a:solidFill>
+            </a:ln>
+          </p:spPr>
+          <p:txBody>
+            <a:bodyPr wrap="none" rtlCol="0">
+              <a:spAutoFit/>
+            </a:bodyPr>
+            <a:lstStyle/>
+            <a:p>
+              <a:pPr algn="ctr"/>
+              <a:r>
+                <a:rPr lang="en-GB" sz="2400" dirty="0"/>
+                <a:t>Crop </a:t>
+              </a:r>
+              <a:br>
+                <a:rPr lang="en-GB" sz="2400" dirty="0"/>
+              </a:br>
+              <a:r>
+                <a:rPr lang="en-GB" sz="2400" dirty="0"/>
+                <a:t>Yield</a:t>
+              </a:r>
+            </a:p>
+          </p:txBody>
+        </p:sp>
+        <p:sp>
+          <p:nvSpPr>
+            <p:cNvPr id="3" name="TextBox 2">
+              <a:extLst>
+                <a:ext uri="{FF2B5EF4-FFF2-40B4-BE49-F238E27FC236}">
+                  <a16:creationId xmlns:a16="http://schemas.microsoft.com/office/drawing/2014/main" id="{363AAE5E-FBEB-93CB-9157-4C06357A4170}"/>
+                </a:ext>
+              </a:extLst>
+            </p:cNvPr>
+            <p:cNvSpPr txBox="1"/>
+            <p:nvPr/>
+          </p:nvSpPr>
+          <p:spPr>
+            <a:xfrm>
+              <a:off x="5855624" y="1578147"/>
+              <a:ext cx="1774448" cy="1687890"/>
+            </a:xfrm>
+            <a:prstGeom prst="ellipse">
+              <a:avLst/>
+            </a:prstGeom>
+            <a:solidFill>
+              <a:schemeClr val="tx2">
+                <a:lumMod val="10000"/>
+              </a:schemeClr>
+            </a:solidFill>
+            <a:ln>
+              <a:solidFill>
+                <a:schemeClr val="tx1"/>
+              </a:solidFill>
+            </a:ln>
+          </p:spPr>
+          <p:txBody>
+            <a:bodyPr wrap="none" rtlCol="0">
+              <a:spAutoFit/>
+            </a:bodyPr>
+            <a:lstStyle/>
+            <a:p>
+              <a:pPr algn="ctr"/>
+              <a:endParaRPr lang="en-GB" sz="2400" dirty="0"/>
+            </a:p>
+            <a:p>
+              <a:pPr algn="ctr"/>
+              <a:r>
+                <a:rPr lang="en-GB" sz="2400" dirty="0"/>
+                <a:t>Species</a:t>
+              </a:r>
+            </a:p>
+            <a:p>
+              <a:pPr algn="ctr"/>
+              <a:endParaRPr lang="en-GB" sz="2400" dirty="0"/>
+            </a:p>
+          </p:txBody>
+        </p:sp>
+        <p:sp>
+          <p:nvSpPr>
+            <p:cNvPr id="4" name="TextBox 3">
+              <a:extLst>
+                <a:ext uri="{FF2B5EF4-FFF2-40B4-BE49-F238E27FC236}">
+                  <a16:creationId xmlns:a16="http://schemas.microsoft.com/office/drawing/2014/main" id="{926D241C-1B8E-8BC1-942A-CAEBB7195BA8}"/>
+                </a:ext>
+              </a:extLst>
+            </p:cNvPr>
+            <p:cNvSpPr txBox="1"/>
+            <p:nvPr/>
+          </p:nvSpPr>
+          <p:spPr>
+            <a:xfrm>
+              <a:off x="5927755" y="3872649"/>
+              <a:ext cx="1702317" cy="1687890"/>
+            </a:xfrm>
+            <a:prstGeom prst="ellipse">
+              <a:avLst/>
+            </a:prstGeom>
+            <a:solidFill>
+              <a:schemeClr val="tx2">
+                <a:lumMod val="10000"/>
+              </a:schemeClr>
+            </a:solidFill>
+            <a:ln>
+              <a:solidFill>
+                <a:schemeClr val="tx1"/>
+              </a:solidFill>
+            </a:ln>
+          </p:spPr>
+          <p:txBody>
+            <a:bodyPr wrap="none" rtlCol="0">
+              <a:spAutoFit/>
+            </a:bodyPr>
+            <a:lstStyle/>
+            <a:p>
+              <a:pPr algn="ctr"/>
+              <a:endParaRPr lang="en-GB" sz="2400" dirty="0"/>
+            </a:p>
+            <a:p>
+              <a:pPr algn="ctr"/>
+              <a:r>
+                <a:rPr lang="en-GB" sz="2400" dirty="0"/>
+                <a:t>Density</a:t>
+              </a:r>
+            </a:p>
+            <a:p>
+              <a:pPr algn="ctr"/>
+              <a:endParaRPr lang="en-GB" sz="2400" dirty="0"/>
+            </a:p>
+          </p:txBody>
+        </p:sp>
+        <p:cxnSp>
+          <p:nvCxnSpPr>
+            <p:cNvPr id="6" name="Straight Arrow Connector 5">
+              <a:extLst>
+                <a:ext uri="{FF2B5EF4-FFF2-40B4-BE49-F238E27FC236}">
+                  <a16:creationId xmlns:a16="http://schemas.microsoft.com/office/drawing/2014/main" id="{A835B032-DCC0-B014-9436-4A2EB2432657}"/>
+                </a:ext>
+              </a:extLst>
+            </p:cNvPr>
+            <p:cNvCxnSpPr>
+              <a:stCxn id="3" idx="6"/>
+              <a:endCxn id="2" idx="1"/>
+            </p:cNvCxnSpPr>
+            <p:nvPr/>
+          </p:nvCxnSpPr>
+          <p:spPr>
+            <a:xfrm>
+              <a:off x="7630072" y="2422092"/>
+              <a:ext cx="1534880" cy="664252"/>
+            </a:xfrm>
+            <a:prstGeom prst="straightConnector1">
+              <a:avLst/>
+            </a:prstGeom>
+            <a:ln w="38100">
+              <a:solidFill>
+                <a:schemeClr val="tx1"/>
+              </a:solidFill>
+              <a:tailEnd type="triangle"/>
+            </a:ln>
+          </p:spPr>
+          <p:style>
+            <a:lnRef idx="2">
+              <a:schemeClr val="accent1"/>
+            </a:lnRef>
+            <a:fillRef idx="0">
+              <a:schemeClr val="accent1"/>
+            </a:fillRef>
+            <a:effectRef idx="1">
+              <a:schemeClr val="accent1"/>
+            </a:effectRef>
+            <a:fontRef idx="minor">
+              <a:schemeClr val="tx1"/>
+            </a:fontRef>
+          </p:style>
+        </p:cxnSp>
+        <p:cxnSp>
+          <p:nvCxnSpPr>
+            <p:cNvPr id="7" name="Straight Arrow Connector 6">
+              <a:extLst>
+                <a:ext uri="{FF2B5EF4-FFF2-40B4-BE49-F238E27FC236}">
+                  <a16:creationId xmlns:a16="http://schemas.microsoft.com/office/drawing/2014/main" id="{B1D68F05-DA07-8B0E-6838-E159A0DF00B7}"/>
+                </a:ext>
+              </a:extLst>
+            </p:cNvPr>
+            <p:cNvCxnSpPr>
+              <a:cxnSpLocks/>
+              <a:stCxn id="4" idx="6"/>
+              <a:endCxn id="2" idx="3"/>
+            </p:cNvCxnSpPr>
+            <p:nvPr/>
+          </p:nvCxnSpPr>
+          <p:spPr>
+            <a:xfrm flipV="1">
+              <a:off x="7630072" y="3912625"/>
+              <a:ext cx="1534880" cy="803969"/>
+            </a:xfrm>
+            <a:prstGeom prst="straightConnector1">
+              <a:avLst/>
+            </a:prstGeom>
+            <a:ln w="38100">
+              <a:solidFill>
+                <a:schemeClr val="tx1"/>
+              </a:solidFill>
+              <a:tailEnd type="triangle"/>
+            </a:ln>
+          </p:spPr>
+          <p:style>
+            <a:lnRef idx="2">
+              <a:schemeClr val="accent1"/>
+            </a:lnRef>
+            <a:fillRef idx="0">
+              <a:schemeClr val="accent1"/>
+            </a:fillRef>
+            <a:effectRef idx="1">
+              <a:schemeClr val="accent1"/>
+            </a:effectRef>
+            <a:fontRef idx="minor">
+              <a:schemeClr val="tx1"/>
+            </a:fontRef>
+          </p:style>
+        </p:cxnSp>
+      </p:grpSp>
+      <p:cxnSp>
+        <p:nvCxnSpPr>
+          <p:cNvPr id="12" name="Straight Arrow Connector 11">
+            <a:extLst>
+              <a:ext uri="{FF2B5EF4-FFF2-40B4-BE49-F238E27FC236}">
+                <a16:creationId xmlns:a16="http://schemas.microsoft.com/office/drawing/2014/main" id="{43616378-DF8F-1AB3-CAF8-76F917905F40}"/>
+              </a:ext>
+            </a:extLst>
+          </p:cNvPr>
+          <p:cNvCxnSpPr>
+            <a:cxnSpLocks/>
+            <a:stCxn id="3" idx="5"/>
+          </p:cNvCxnSpPr>
+          <p:nvPr/>
+        </p:nvCxnSpPr>
+        <p:spPr>
+          <a:xfrm>
+            <a:off x="4717545" y="3046011"/>
+            <a:ext cx="1004245" cy="1272492"/>
+          </a:xfrm>
+          <a:prstGeom prst="straightConnector1">
+            <a:avLst/>
+          </a:prstGeom>
+          <a:ln w="38100">
+            <a:solidFill>
+              <a:schemeClr val="tx1"/>
+            </a:solidFill>
+            <a:tailEnd type="triangle"/>
+          </a:ln>
+        </p:spPr>
+        <p:style>
+          <a:lnRef idx="2">
+            <a:schemeClr val="accent1"/>
+          </a:lnRef>
+          <a:fillRef idx="0">
+            <a:schemeClr val="accent1"/>
+          </a:fillRef>
+          <a:effectRef idx="1">
+            <a:schemeClr val="accent1"/>
+          </a:effectRef>
+          <a:fontRef idx="minor">
+            <a:schemeClr val="tx1"/>
+          </a:fontRef>
+        </p:style>
+      </p:cxnSp>
+    </p:spTree>
+    <p:extLst>
+      <p:ext uri="{BB962C8B-B14F-4D97-AF65-F5344CB8AC3E}">
+        <p14:creationId xmlns:p14="http://schemas.microsoft.com/office/powerpoint/2010/main" val="3073695034"/>
+      </p:ext>
+    </p:extLst>
+  </p:cSld>
+  <p:clrMapOvr>
+    <a:masterClrMapping/>
+  </p:clrMapOvr>
+  <mc:AlternateContent xmlns:mc="http://schemas.openxmlformats.org/markup-compatibility/2006">
+    <mc:Choice xmlns:p14="http://schemas.microsoft.com/office/powerpoint/2010/main" Requires="p14">
+      <p:transition spd="med" p14:dur="700">
+        <p:fade/>
+      </p:transition>
+    </mc:Choice>
+    <mc:Fallback>
+      <p:transition spd="med">
+        <p:fade/>
+      </p:transition>
+    </mc:Fallback>
+  </mc:AlternateContent>
+  <p:timing>
+    <p:tnLst>
+      <p:par>
+        <p:cTn id="1" dur="indefinite" restart="never" nodeType="tmRoot">
+          <p:childTnLst>
+            <p:seq concurrent="1" nextAc="seek">
+              <p:cTn id="2" dur="indefinite" nodeType="mainSeq">
+                <p:childTnLst>
+                  <p:par>
+                    <p:cTn id="3" fill="hold">
+                      <p:stCondLst>
+                        <p:cond delay="indefinite"/>
+                      </p:stCondLst>
+                      <p:childTnLst>
+                        <p:par>
+                          <p:cTn id="4" fill="hold">
+                            <p:stCondLst>
+                              <p:cond delay="0"/>
+                            </p:stCondLst>
+                            <p:childTnLst>
+                              <p:par>
+                                <p:cTn id="5" presetID="10" presetClass="entr" presetSubtype="0" fill="hold" nodeType="clickEffect">
+                                  <p:stCondLst>
+                                    <p:cond delay="0"/>
+                                  </p:stCondLst>
+                                  <p:childTnLst>
+                                    <p:set>
+                                      <p:cBhvr>
+                                        <p:cTn id="6" dur="1" fill="hold">
+                                          <p:stCondLst>
+                                            <p:cond delay="0"/>
+                                          </p:stCondLst>
+                                        </p:cTn>
+                                        <p:tgtEl>
+                                          <p:spTgt spid="12"/>
+                                        </p:tgtEl>
+                                        <p:attrNameLst>
+                                          <p:attrName>style.visibility</p:attrName>
+                                        </p:attrNameLst>
+                                      </p:cBhvr>
+                                      <p:to>
+                                        <p:strVal val="visible"/>
+                                      </p:to>
+                                    </p:set>
+                                    <p:animEffect transition="in" filter="fade">
+                                      <p:cBhvr>
+                                        <p:cTn id="7" dur="500"/>
+                                        <p:tgtEl>
+                                          <p:spTgt spid="12"/>
+                                        </p:tgtEl>
+                                      </p:cBhvr>
+                                    </p:animEffect>
+                                  </p:childTnLst>
+                                </p:cTn>
+                              </p:par>
+                            </p:childTnLst>
+                          </p:cTn>
+                        </p:par>
+                      </p:childTnLst>
+                    </p:cTn>
+                  </p:par>
+                </p:childTnLst>
+              </p:cTn>
+              <p:prevCondLst>
+                <p:cond evt="onPrev" delay="0">
+                  <p:tgtEl>
+                    <p:sldTgt/>
+                  </p:tgtEl>
+                </p:cond>
+              </p:prevCondLst>
+              <p:nextCondLst>
+                <p:cond evt="onNext" delay="0">
+                  <p:tgtEl>
+                    <p:sldTgt/>
+                  </p:tgtEl>
+                </p:cond>
+              </p:nextCondLst>
+            </p:seq>
+          </p:childTnLst>
+        </p:cTn>
+      </p:par>
+    </p:tnLst>
+  </p:timing>
+</p:sld>
+</file>
+
+<file path=ppt/slides/slide18.xml><?xml version="1.0" encoding="utf-8"?>
+<p:sld xmlns:a="http://schemas.openxmlformats.org/drawingml/2006/main" xmlns:r="http://schemas.openxmlformats.org/officeDocument/2006/relationships" xmlns:p="http://schemas.openxmlformats.org/presentationml/2006/main">
+  <p:cSld>
+    <p:spTree>
+      <p:nvGrpSpPr>
+        <p:cNvPr id="1" name=""/>
+        <p:cNvGrpSpPr/>
+        <p:nvPr/>
+      </p:nvGrpSpPr>
+      <p:grpSpPr>
+        <a:xfrm>
+          <a:off x="0" y="0"/>
+          <a:ext cx="0" cy="0"/>
+          <a:chOff x="0" y="0"/>
+          <a:chExt cx="0" cy="0"/>
+        </a:xfrm>
+      </p:grpSpPr>
+      <p:sp>
+        <p:nvSpPr>
+          <p:cNvPr id="2" name="Title 1">
+            <a:extLst>
+              <a:ext uri="{FF2B5EF4-FFF2-40B4-BE49-F238E27FC236}">
+                <a16:creationId xmlns:a16="http://schemas.microsoft.com/office/drawing/2014/main" id="{1F89F010-94CF-0EC9-D478-FE123C2DD73C}"/>
+              </a:ext>
+            </a:extLst>
+          </p:cNvPr>
+          <p:cNvSpPr>
+            <a:spLocks noGrp="1"/>
+          </p:cNvSpPr>
+          <p:nvPr>
+            <p:ph type="title"/>
+          </p:nvPr>
+        </p:nvSpPr>
+        <p:spPr/>
+        <p:txBody>
+          <a:bodyPr/>
+          <a:lstStyle/>
+          <a:p>
+            <a:r>
+              <a:rPr lang="en-GB" dirty="0"/>
+              <a:t>The question</a:t>
+            </a:r>
+          </a:p>
+        </p:txBody>
+      </p:sp>
+      <p:sp>
+        <p:nvSpPr>
+          <p:cNvPr id="3" name="Content Placeholder 2">
+            <a:extLst>
+              <a:ext uri="{FF2B5EF4-FFF2-40B4-BE49-F238E27FC236}">
+                <a16:creationId xmlns:a16="http://schemas.microsoft.com/office/drawing/2014/main" id="{6517CAAC-048A-4E91-25CC-52FD31B0B873}"/>
+              </a:ext>
+            </a:extLst>
+          </p:cNvPr>
+          <p:cNvSpPr>
+            <a:spLocks noGrp="1"/>
+          </p:cNvSpPr>
+          <p:nvPr>
+            <p:ph idx="1"/>
+          </p:nvPr>
+        </p:nvSpPr>
+        <p:spPr>
+          <a:xfrm>
+            <a:off x="0" y="1426613"/>
+            <a:ext cx="6500926" cy="5240194"/>
+          </a:xfrm>
+        </p:spPr>
+        <p:txBody>
+          <a:bodyPr/>
+          <a:lstStyle/>
+          <a:p>
+            <a:r>
+              <a:rPr lang="en-GB" dirty="0">
+                <a:latin typeface="Courier New" panose="02070309020205020404" pitchFamily="49" charset="0"/>
+                <a:cs typeface="Courier New" panose="02070309020205020404" pitchFamily="49" charset="0"/>
+              </a:rPr>
+              <a:t>crop ~ species * density</a:t>
+            </a:r>
+            <a:endParaRPr lang="en-GB" dirty="0"/>
+          </a:p>
+        </p:txBody>
+      </p:sp>
+      <p:grpSp>
+        <p:nvGrpSpPr>
+          <p:cNvPr id="4" name="Group 3">
+            <a:extLst>
+              <a:ext uri="{FF2B5EF4-FFF2-40B4-BE49-F238E27FC236}">
+                <a16:creationId xmlns:a16="http://schemas.microsoft.com/office/drawing/2014/main" id="{ED791819-B7E9-1B7B-F5E5-49EBCD58E408}"/>
+              </a:ext>
+            </a:extLst>
+          </p:cNvPr>
+          <p:cNvGrpSpPr/>
+          <p:nvPr/>
+        </p:nvGrpSpPr>
+        <p:grpSpPr>
+          <a:xfrm>
+            <a:off x="6987308" y="2064216"/>
+            <a:ext cx="4416022" cy="3982392"/>
+            <a:chOff x="5855624" y="1578147"/>
+            <a:chExt cx="4416022" cy="3982392"/>
+          </a:xfrm>
+        </p:grpSpPr>
+        <p:sp>
+          <p:nvSpPr>
+            <p:cNvPr id="5" name="TextBox 4">
+              <a:extLst>
+                <a:ext uri="{FF2B5EF4-FFF2-40B4-BE49-F238E27FC236}">
+                  <a16:creationId xmlns:a16="http://schemas.microsoft.com/office/drawing/2014/main" id="{FF15906D-3E27-3451-0735-A55851B450B0}"/>
+                </a:ext>
+              </a:extLst>
+            </p:cNvPr>
+            <p:cNvSpPr txBox="1"/>
+            <p:nvPr/>
+          </p:nvSpPr>
+          <p:spPr>
+            <a:xfrm>
+              <a:off x="8975073" y="2915215"/>
+              <a:ext cx="1296573" cy="1168539"/>
+            </a:xfrm>
+            <a:prstGeom prst="ellipse">
+              <a:avLst/>
+            </a:prstGeom>
+            <a:solidFill>
+              <a:schemeClr val="tx2">
+                <a:lumMod val="10000"/>
+              </a:schemeClr>
+            </a:solidFill>
+            <a:ln>
+              <a:solidFill>
+                <a:schemeClr val="tx1"/>
+              </a:solidFill>
+            </a:ln>
+          </p:spPr>
+          <p:txBody>
+            <a:bodyPr wrap="none" rtlCol="0">
+              <a:spAutoFit/>
+            </a:bodyPr>
+            <a:lstStyle/>
+            <a:p>
+              <a:pPr algn="ctr"/>
+              <a:r>
+                <a:rPr lang="en-GB" sz="2400" dirty="0"/>
+                <a:t>Crop </a:t>
+              </a:r>
+              <a:br>
+                <a:rPr lang="en-GB" sz="2400" dirty="0"/>
+              </a:br>
+              <a:r>
+                <a:rPr lang="en-GB" sz="2400" dirty="0"/>
+                <a:t>Yield</a:t>
+              </a:r>
+            </a:p>
+          </p:txBody>
+        </p:sp>
+        <p:sp>
+          <p:nvSpPr>
+            <p:cNvPr id="7" name="TextBox 6">
+              <a:extLst>
+                <a:ext uri="{FF2B5EF4-FFF2-40B4-BE49-F238E27FC236}">
+                  <a16:creationId xmlns:a16="http://schemas.microsoft.com/office/drawing/2014/main" id="{59760275-A73E-B75E-8228-2622612EA6AB}"/>
+                </a:ext>
+              </a:extLst>
+            </p:cNvPr>
+            <p:cNvSpPr txBox="1"/>
+            <p:nvPr/>
+          </p:nvSpPr>
+          <p:spPr>
+            <a:xfrm>
+              <a:off x="5855624" y="1578147"/>
+              <a:ext cx="1774448" cy="1687890"/>
+            </a:xfrm>
+            <a:prstGeom prst="ellipse">
+              <a:avLst/>
+            </a:prstGeom>
+            <a:solidFill>
+              <a:schemeClr val="tx2">
+                <a:lumMod val="10000"/>
+              </a:schemeClr>
+            </a:solidFill>
+            <a:ln>
+              <a:solidFill>
+                <a:schemeClr val="tx1"/>
+              </a:solidFill>
+            </a:ln>
+          </p:spPr>
+          <p:txBody>
+            <a:bodyPr wrap="none" rtlCol="0">
+              <a:spAutoFit/>
+            </a:bodyPr>
+            <a:lstStyle/>
+            <a:p>
+              <a:pPr algn="ctr"/>
+              <a:endParaRPr lang="en-GB" sz="2400" dirty="0"/>
+            </a:p>
+            <a:p>
+              <a:pPr algn="ctr"/>
+              <a:r>
+                <a:rPr lang="en-GB" sz="2400" dirty="0"/>
+                <a:t>Species</a:t>
+              </a:r>
+            </a:p>
+            <a:p>
+              <a:pPr algn="ctr"/>
+              <a:endParaRPr lang="en-GB" sz="2400" dirty="0"/>
+            </a:p>
+          </p:txBody>
+        </p:sp>
+        <p:sp>
+          <p:nvSpPr>
+            <p:cNvPr id="9" name="TextBox 8">
+              <a:extLst>
+                <a:ext uri="{FF2B5EF4-FFF2-40B4-BE49-F238E27FC236}">
+                  <a16:creationId xmlns:a16="http://schemas.microsoft.com/office/drawing/2014/main" id="{604734D6-3A0E-55CE-DF27-B39D55D0190A}"/>
+                </a:ext>
+              </a:extLst>
+            </p:cNvPr>
+            <p:cNvSpPr txBox="1"/>
+            <p:nvPr/>
+          </p:nvSpPr>
+          <p:spPr>
+            <a:xfrm>
+              <a:off x="5927755" y="3872649"/>
+              <a:ext cx="1702317" cy="1687890"/>
+            </a:xfrm>
+            <a:prstGeom prst="ellipse">
+              <a:avLst/>
+            </a:prstGeom>
+            <a:solidFill>
+              <a:schemeClr val="tx2">
+                <a:lumMod val="10000"/>
+              </a:schemeClr>
+            </a:solidFill>
+            <a:ln>
+              <a:solidFill>
+                <a:schemeClr val="tx1"/>
+              </a:solidFill>
+            </a:ln>
+          </p:spPr>
+          <p:txBody>
+            <a:bodyPr wrap="none" rtlCol="0">
+              <a:spAutoFit/>
+            </a:bodyPr>
+            <a:lstStyle/>
+            <a:p>
+              <a:pPr algn="ctr"/>
+              <a:endParaRPr lang="en-GB" sz="2400" dirty="0"/>
+            </a:p>
+            <a:p>
+              <a:pPr algn="ctr"/>
+              <a:r>
+                <a:rPr lang="en-GB" sz="2400" dirty="0"/>
+                <a:t>Density</a:t>
+              </a:r>
+            </a:p>
+            <a:p>
+              <a:pPr algn="ctr"/>
+              <a:endParaRPr lang="en-GB" sz="2400" dirty="0"/>
+            </a:p>
+          </p:txBody>
+        </p:sp>
+        <p:cxnSp>
+          <p:nvCxnSpPr>
+            <p:cNvPr id="11" name="Straight Arrow Connector 10">
+              <a:extLst>
+                <a:ext uri="{FF2B5EF4-FFF2-40B4-BE49-F238E27FC236}">
+                  <a16:creationId xmlns:a16="http://schemas.microsoft.com/office/drawing/2014/main" id="{0106CFAF-D67F-39EA-8E3A-F2FAD7BE3F0B}"/>
+                </a:ext>
+              </a:extLst>
+            </p:cNvPr>
+            <p:cNvCxnSpPr>
+              <a:stCxn id="7" idx="6"/>
+              <a:endCxn id="5" idx="1"/>
+            </p:cNvCxnSpPr>
+            <p:nvPr/>
+          </p:nvCxnSpPr>
+          <p:spPr>
+            <a:xfrm>
+              <a:off x="7630072" y="2422092"/>
+              <a:ext cx="1534880" cy="664252"/>
+            </a:xfrm>
+            <a:prstGeom prst="straightConnector1">
+              <a:avLst/>
+            </a:prstGeom>
+            <a:ln w="38100">
+              <a:solidFill>
+                <a:schemeClr val="tx1"/>
+              </a:solidFill>
+              <a:tailEnd type="triangle"/>
+            </a:ln>
+          </p:spPr>
+          <p:style>
+            <a:lnRef idx="2">
+              <a:schemeClr val="accent1"/>
+            </a:lnRef>
+            <a:fillRef idx="0">
+              <a:schemeClr val="accent1"/>
+            </a:fillRef>
+            <a:effectRef idx="1">
+              <a:schemeClr val="accent1"/>
+            </a:effectRef>
+            <a:fontRef idx="minor">
+              <a:schemeClr val="tx1"/>
+            </a:fontRef>
+          </p:style>
+        </p:cxnSp>
+        <p:cxnSp>
+          <p:nvCxnSpPr>
+            <p:cNvPr id="13" name="Straight Arrow Connector 12">
+              <a:extLst>
+                <a:ext uri="{FF2B5EF4-FFF2-40B4-BE49-F238E27FC236}">
+                  <a16:creationId xmlns:a16="http://schemas.microsoft.com/office/drawing/2014/main" id="{5682C348-BD4C-5A7B-835E-0744F9667725}"/>
+                </a:ext>
+              </a:extLst>
+            </p:cNvPr>
+            <p:cNvCxnSpPr>
+              <a:cxnSpLocks/>
+              <a:stCxn id="9" idx="6"/>
+              <a:endCxn id="5" idx="3"/>
+            </p:cNvCxnSpPr>
+            <p:nvPr/>
+          </p:nvCxnSpPr>
+          <p:spPr>
+            <a:xfrm flipV="1">
+              <a:off x="7630072" y="3912625"/>
+              <a:ext cx="1534880" cy="803969"/>
+            </a:xfrm>
+            <a:prstGeom prst="straightConnector1">
+              <a:avLst/>
+            </a:prstGeom>
+            <a:ln w="38100">
+              <a:solidFill>
+                <a:schemeClr val="tx1"/>
+              </a:solidFill>
+              <a:tailEnd type="triangle"/>
+            </a:ln>
+          </p:spPr>
+          <p:style>
+            <a:lnRef idx="2">
+              <a:schemeClr val="accent1"/>
+            </a:lnRef>
+            <a:fillRef idx="0">
+              <a:schemeClr val="accent1"/>
+            </a:fillRef>
+            <a:effectRef idx="1">
+              <a:schemeClr val="accent1"/>
+            </a:effectRef>
+            <a:fontRef idx="minor">
+              <a:schemeClr val="tx1"/>
+            </a:fontRef>
+          </p:style>
+        </p:cxnSp>
+      </p:grpSp>
+      <p:cxnSp>
+        <p:nvCxnSpPr>
+          <p:cNvPr id="16" name="Straight Arrow Connector 15">
+            <a:extLst>
+              <a:ext uri="{FF2B5EF4-FFF2-40B4-BE49-F238E27FC236}">
+                <a16:creationId xmlns:a16="http://schemas.microsoft.com/office/drawing/2014/main" id="{40DC51A6-0662-4CD2-D344-D7FB088924CB}"/>
+              </a:ext>
+            </a:extLst>
+          </p:cNvPr>
+          <p:cNvCxnSpPr>
+            <a:cxnSpLocks/>
+            <a:stCxn id="7" idx="5"/>
+          </p:cNvCxnSpPr>
+          <p:nvPr/>
+        </p:nvCxnSpPr>
+        <p:spPr>
+          <a:xfrm>
+            <a:off x="8501894" y="3504920"/>
+            <a:ext cx="1000291" cy="1310351"/>
+          </a:xfrm>
+          <a:prstGeom prst="straightConnector1">
+            <a:avLst/>
+          </a:prstGeom>
+          <a:ln w="38100">
+            <a:solidFill>
+              <a:schemeClr val="tx1"/>
+            </a:solidFill>
+            <a:tailEnd type="triangle"/>
+          </a:ln>
+        </p:spPr>
+        <p:style>
+          <a:lnRef idx="2">
+            <a:schemeClr val="accent1"/>
+          </a:lnRef>
+          <a:fillRef idx="0">
+            <a:schemeClr val="accent1"/>
+          </a:fillRef>
+          <a:effectRef idx="1">
+            <a:schemeClr val="accent1"/>
+          </a:effectRef>
+          <a:fontRef idx="minor">
+            <a:schemeClr val="tx1"/>
+          </a:fontRef>
+        </p:style>
+      </p:cxnSp>
+    </p:spTree>
+    <p:extLst>
+      <p:ext uri="{BB962C8B-B14F-4D97-AF65-F5344CB8AC3E}">
+        <p14:creationId xmlns:p14="http://schemas.microsoft.com/office/powerpoint/2010/main" val="1907881573"/>
+      </p:ext>
+    </p:extLst>
+  </p:cSld>
+  <p:clrMapOvr>
+    <a:masterClrMapping/>
+  </p:clrMapOvr>
+  <mc:AlternateContent xmlns:mc="http://schemas.openxmlformats.org/markup-compatibility/2006">
+    <mc:Choice xmlns:p14="http://schemas.microsoft.com/office/powerpoint/2010/main" Requires="p14">
+      <p:transition spd="med" p14:dur="700">
+        <p:fade/>
+      </p:transition>
+    </mc:Choice>
+    <mc:Fallback>
+      <p:transition spd="med">
+        <p:fade/>
+      </p:transition>
+    </mc:Fallback>
+  </mc:AlternateContent>
+  <p:timing>
+    <p:tnLst>
+      <p:par>
+        <p:cTn id="1" dur="indefinite" restart="never" nodeType="tmRoot">
+          <p:childTnLst>
+            <p:seq concurrent="1" nextAc="seek">
+              <p:cTn id="2" dur="indefinite" nodeType="mainSeq">
+                <p:childTnLst>
+                  <p:par>
+                    <p:cTn id="3" fill="hold">
+                      <p:stCondLst>
+                        <p:cond delay="indefinite"/>
+                      </p:stCondLst>
+                      <p:childTnLst>
+                        <p:par>
+                          <p:cTn id="4" fill="hold">
+                            <p:stCondLst>
+                              <p:cond delay="0"/>
+                            </p:stCondLst>
+                            <p:childTnLst>
+                              <p:par>
+                                <p:cTn id="5" presetID="10" presetClass="entr" presetSubtype="0" fill="hold" grpId="0" nodeType="clickEffect">
+                                  <p:stCondLst>
+                                    <p:cond delay="0"/>
+                                  </p:stCondLst>
+                                  <p:childTnLst>
+                                    <p:set>
+                                      <p:cBhvr>
+                                        <p:cTn id="6" dur="1" fill="hold">
+                                          <p:stCondLst>
+                                            <p:cond delay="0"/>
+                                          </p:stCondLst>
+                                        </p:cTn>
+                                        <p:tgtEl>
+                                          <p:spTgt spid="3">
+                                            <p:txEl>
+                                              <p:pRg st="0" end="0"/>
+                                            </p:txEl>
+                                          </p:spTgt>
+                                        </p:tgtEl>
+                                        <p:attrNameLst>
+                                          <p:attrName>style.visibility</p:attrName>
+                                        </p:attrNameLst>
+                                      </p:cBhvr>
+                                      <p:to>
+                                        <p:strVal val="visible"/>
+                                      </p:to>
+                                    </p:set>
+                                    <p:animEffect transition="in" filter="fade">
+                                      <p:cBhvr>
+                                        <p:cTn id="7" dur="500"/>
+                                        <p:tgtEl>
+                                          <p:spTgt spid="3">
+                                            <p:txEl>
+                                              <p:pRg st="0" end="0"/>
+                                            </p:txEl>
+                                          </p:spTgt>
+                                        </p:tgtEl>
+                                      </p:cBhvr>
+                                    </p:animEffect>
+                                  </p:childTnLst>
+                                </p:cTn>
+                              </p:par>
+                            </p:childTnLst>
+                          </p:cTn>
+                        </p:par>
+                      </p:childTnLst>
+                    </p:cTn>
+                  </p:par>
+                </p:childTnLst>
+              </p:cTn>
+              <p:prevCondLst>
+                <p:cond evt="onPrev" delay="0">
+                  <p:tgtEl>
+                    <p:sldTgt/>
+                  </p:tgtEl>
+                </p:cond>
+              </p:prevCondLst>
+              <p:nextCondLst>
+                <p:cond evt="onNext" delay="0">
+                  <p:tgtEl>
+                    <p:sldTgt/>
+                  </p:tgtEl>
+                </p:cond>
+              </p:nextCondLst>
+            </p:seq>
+          </p:childTnLst>
+        </p:cTn>
+      </p:par>
+    </p:tnLst>
+    <p:bldLst>
+      <p:bldP spid="3" grpId="0" uiExpand="1" build="p"/>
+    </p:bldLst>
+  </p:timing>
+</p:sld>
+</file>
+
 <file path=ppt/slides/slide2.xml><?xml version="1.0" encoding="utf-8"?>
 <p:sld xmlns:a="http://schemas.openxmlformats.org/drawingml/2006/main" xmlns:r="http://schemas.openxmlformats.org/officeDocument/2006/relationships" xmlns:p="http://schemas.openxmlformats.org/presentationml/2006/main">
   <p:cSld>
@@ -8385,6 +10739,18 @@
   <p:clrMapOvr>
     <a:masterClrMapping/>
   </p:clrMapOvr>
+  <mc:AlternateContent xmlns:mc="http://schemas.openxmlformats.org/markup-compatibility/2006">
+    <mc:Choice xmlns:p14="http://schemas.microsoft.com/office/powerpoint/2010/main" Requires="p14">
+      <p:transition spd="med" p14:dur="700">
+        <p:fade/>
+      </p:transition>
+    </mc:Choice>
+    <mc:Fallback>
+      <p:transition spd="med">
+        <p:fade/>
+      </p:transition>
+    </mc:Fallback>
+  </mc:AlternateContent>
   <p:timing>
     <p:tnLst>
       <p:par>
@@ -8762,7 +11128,7 @@
           <a:p>
             <a:r>
               <a:rPr lang="en-GB" dirty="0"/>
-              <a:t>We want to understand how each species influences VOC emission</a:t>
+              <a:t>We want to understand how each species influences crop yield</a:t>
             </a:r>
           </a:p>
           <a:p>
@@ -8926,6 +11292,276 @@
           </a:prstGeom>
         </p:spPr>
       </p:pic>
+      <p:grpSp>
+        <p:nvGrpSpPr>
+          <p:cNvPr id="4" name="Group 3">
+            <a:extLst>
+              <a:ext uri="{FF2B5EF4-FFF2-40B4-BE49-F238E27FC236}">
+                <a16:creationId xmlns:a16="http://schemas.microsoft.com/office/drawing/2014/main" id="{ED791819-B7E9-1B7B-F5E5-49EBCD58E408}"/>
+              </a:ext>
+            </a:extLst>
+          </p:cNvPr>
+          <p:cNvGrpSpPr/>
+          <p:nvPr/>
+        </p:nvGrpSpPr>
+        <p:grpSpPr>
+          <a:xfrm>
+            <a:off x="6987308" y="2064216"/>
+            <a:ext cx="4416022" cy="3982392"/>
+            <a:chOff x="5855624" y="1578147"/>
+            <a:chExt cx="4416022" cy="3982392"/>
+          </a:xfrm>
+        </p:grpSpPr>
+        <p:sp>
+          <p:nvSpPr>
+            <p:cNvPr id="5" name="TextBox 4">
+              <a:extLst>
+                <a:ext uri="{FF2B5EF4-FFF2-40B4-BE49-F238E27FC236}">
+                  <a16:creationId xmlns:a16="http://schemas.microsoft.com/office/drawing/2014/main" id="{FF15906D-3E27-3451-0735-A55851B450B0}"/>
+                </a:ext>
+              </a:extLst>
+            </p:cNvPr>
+            <p:cNvSpPr txBox="1"/>
+            <p:nvPr/>
+          </p:nvSpPr>
+          <p:spPr>
+            <a:xfrm>
+              <a:off x="8975073" y="2915215"/>
+              <a:ext cx="1296573" cy="1168539"/>
+            </a:xfrm>
+            <a:prstGeom prst="ellipse">
+              <a:avLst/>
+            </a:prstGeom>
+            <a:solidFill>
+              <a:schemeClr val="tx2">
+                <a:lumMod val="10000"/>
+              </a:schemeClr>
+            </a:solidFill>
+            <a:ln>
+              <a:solidFill>
+                <a:schemeClr val="tx1"/>
+              </a:solidFill>
+            </a:ln>
+          </p:spPr>
+          <p:txBody>
+            <a:bodyPr wrap="none" rtlCol="0">
+              <a:spAutoFit/>
+            </a:bodyPr>
+            <a:lstStyle/>
+            <a:p>
+              <a:pPr algn="ctr"/>
+              <a:r>
+                <a:rPr lang="en-GB" sz="2400" dirty="0"/>
+                <a:t>Crop </a:t>
+              </a:r>
+              <a:br>
+                <a:rPr lang="en-GB" sz="2400" dirty="0"/>
+              </a:br>
+              <a:r>
+                <a:rPr lang="en-GB" sz="2400" dirty="0"/>
+                <a:t>Yield</a:t>
+              </a:r>
+            </a:p>
+          </p:txBody>
+        </p:sp>
+        <p:sp>
+          <p:nvSpPr>
+            <p:cNvPr id="7" name="TextBox 6">
+              <a:extLst>
+                <a:ext uri="{FF2B5EF4-FFF2-40B4-BE49-F238E27FC236}">
+                  <a16:creationId xmlns:a16="http://schemas.microsoft.com/office/drawing/2014/main" id="{59760275-A73E-B75E-8228-2622612EA6AB}"/>
+                </a:ext>
+              </a:extLst>
+            </p:cNvPr>
+            <p:cNvSpPr txBox="1"/>
+            <p:nvPr/>
+          </p:nvSpPr>
+          <p:spPr>
+            <a:xfrm>
+              <a:off x="5855624" y="1578147"/>
+              <a:ext cx="1774448" cy="1687890"/>
+            </a:xfrm>
+            <a:prstGeom prst="ellipse">
+              <a:avLst/>
+            </a:prstGeom>
+            <a:solidFill>
+              <a:schemeClr val="tx2">
+                <a:lumMod val="10000"/>
+              </a:schemeClr>
+            </a:solidFill>
+            <a:ln>
+              <a:solidFill>
+                <a:schemeClr val="tx1"/>
+              </a:solidFill>
+            </a:ln>
+          </p:spPr>
+          <p:txBody>
+            <a:bodyPr wrap="none" rtlCol="0">
+              <a:spAutoFit/>
+            </a:bodyPr>
+            <a:lstStyle/>
+            <a:p>
+              <a:pPr algn="ctr"/>
+              <a:endParaRPr lang="en-GB" sz="2400" dirty="0"/>
+            </a:p>
+            <a:p>
+              <a:pPr algn="ctr"/>
+              <a:r>
+                <a:rPr lang="en-GB" sz="2400" dirty="0"/>
+                <a:t>Species</a:t>
+              </a:r>
+            </a:p>
+            <a:p>
+              <a:pPr algn="ctr"/>
+              <a:endParaRPr lang="en-GB" sz="2400" dirty="0"/>
+            </a:p>
+          </p:txBody>
+        </p:sp>
+        <p:sp>
+          <p:nvSpPr>
+            <p:cNvPr id="9" name="TextBox 8">
+              <a:extLst>
+                <a:ext uri="{FF2B5EF4-FFF2-40B4-BE49-F238E27FC236}">
+                  <a16:creationId xmlns:a16="http://schemas.microsoft.com/office/drawing/2014/main" id="{604734D6-3A0E-55CE-DF27-B39D55D0190A}"/>
+                </a:ext>
+              </a:extLst>
+            </p:cNvPr>
+            <p:cNvSpPr txBox="1"/>
+            <p:nvPr/>
+          </p:nvSpPr>
+          <p:spPr>
+            <a:xfrm>
+              <a:off x="5927755" y="3872649"/>
+              <a:ext cx="1702317" cy="1687890"/>
+            </a:xfrm>
+            <a:prstGeom prst="ellipse">
+              <a:avLst/>
+            </a:prstGeom>
+            <a:solidFill>
+              <a:schemeClr val="tx2">
+                <a:lumMod val="10000"/>
+              </a:schemeClr>
+            </a:solidFill>
+            <a:ln>
+              <a:solidFill>
+                <a:schemeClr val="tx1"/>
+              </a:solidFill>
+            </a:ln>
+          </p:spPr>
+          <p:txBody>
+            <a:bodyPr wrap="none" rtlCol="0">
+              <a:spAutoFit/>
+            </a:bodyPr>
+            <a:lstStyle/>
+            <a:p>
+              <a:pPr algn="ctr"/>
+              <a:endParaRPr lang="en-GB" sz="2400" dirty="0"/>
+            </a:p>
+            <a:p>
+              <a:pPr algn="ctr"/>
+              <a:r>
+                <a:rPr lang="en-GB" sz="2400" dirty="0"/>
+                <a:t>Density</a:t>
+              </a:r>
+            </a:p>
+            <a:p>
+              <a:pPr algn="ctr"/>
+              <a:endParaRPr lang="en-GB" sz="2400" dirty="0"/>
+            </a:p>
+          </p:txBody>
+        </p:sp>
+        <p:cxnSp>
+          <p:nvCxnSpPr>
+            <p:cNvPr id="11" name="Straight Arrow Connector 10">
+              <a:extLst>
+                <a:ext uri="{FF2B5EF4-FFF2-40B4-BE49-F238E27FC236}">
+                  <a16:creationId xmlns:a16="http://schemas.microsoft.com/office/drawing/2014/main" id="{0106CFAF-D67F-39EA-8E3A-F2FAD7BE3F0B}"/>
+                </a:ext>
+              </a:extLst>
+            </p:cNvPr>
+            <p:cNvCxnSpPr>
+              <a:stCxn id="7" idx="6"/>
+              <a:endCxn id="5" idx="1"/>
+            </p:cNvCxnSpPr>
+            <p:nvPr/>
+          </p:nvCxnSpPr>
+          <p:spPr>
+            <a:xfrm>
+              <a:off x="7630072" y="2422092"/>
+              <a:ext cx="1534880" cy="664252"/>
+            </a:xfrm>
+            <a:prstGeom prst="straightConnector1">
+              <a:avLst/>
+            </a:prstGeom>
+            <a:ln w="38100">
+              <a:solidFill>
+                <a:schemeClr val="tx1"/>
+              </a:solidFill>
+              <a:tailEnd type="triangle"/>
+            </a:ln>
+          </p:spPr>
+          <p:style>
+            <a:lnRef idx="2">
+              <a:schemeClr val="accent1"/>
+            </a:lnRef>
+            <a:fillRef idx="0">
+              <a:schemeClr val="accent1"/>
+            </a:fillRef>
+            <a:effectRef idx="1">
+              <a:schemeClr val="accent1"/>
+            </a:effectRef>
+            <a:fontRef idx="minor">
+              <a:schemeClr val="tx1"/>
+            </a:fontRef>
+          </p:style>
+        </p:cxnSp>
+        <p:cxnSp>
+          <p:nvCxnSpPr>
+            <p:cNvPr id="13" name="Straight Arrow Connector 12">
+              <a:extLst>
+                <a:ext uri="{FF2B5EF4-FFF2-40B4-BE49-F238E27FC236}">
+                  <a16:creationId xmlns:a16="http://schemas.microsoft.com/office/drawing/2014/main" id="{5682C348-BD4C-5A7B-835E-0744F9667725}"/>
+                </a:ext>
+              </a:extLst>
+            </p:cNvPr>
+            <p:cNvCxnSpPr>
+              <a:cxnSpLocks/>
+              <a:stCxn id="9" idx="6"/>
+              <a:endCxn id="5" idx="3"/>
+            </p:cNvCxnSpPr>
+            <p:nvPr/>
+          </p:nvCxnSpPr>
+          <p:spPr>
+            <a:xfrm flipV="1">
+              <a:off x="7630072" y="3912625"/>
+              <a:ext cx="1534880" cy="803969"/>
+            </a:xfrm>
+            <a:prstGeom prst="straightConnector1">
+              <a:avLst/>
+            </a:prstGeom>
+            <a:ln w="38100">
+              <a:solidFill>
+                <a:schemeClr val="tx1"/>
+              </a:solidFill>
+              <a:tailEnd type="triangle"/>
+            </a:ln>
+          </p:spPr>
+          <p:style>
+            <a:lnRef idx="2">
+              <a:schemeClr val="accent1"/>
+            </a:lnRef>
+            <a:fillRef idx="0">
+              <a:schemeClr val="accent1"/>
+            </a:fillRef>
+            <a:effectRef idx="1">
+              <a:schemeClr val="accent1"/>
+            </a:effectRef>
+            <a:fontRef idx="minor">
+              <a:schemeClr val="tx1"/>
+            </a:fontRef>
+          </p:style>
+        </p:cxnSp>
+      </p:grpSp>
     </p:spTree>
     <p:extLst>
       <p:ext uri="{BB962C8B-B14F-4D97-AF65-F5344CB8AC3E}">
@@ -8936,6 +11572,18 @@
   <p:clrMapOvr>
     <a:masterClrMapping/>
   </p:clrMapOvr>
+  <mc:AlternateContent xmlns:mc="http://schemas.openxmlformats.org/markup-compatibility/2006">
+    <mc:Choice xmlns:p14="http://schemas.microsoft.com/office/powerpoint/2010/main" Requires="p14">
+      <p:transition spd="med" p14:dur="700">
+        <p:fade/>
+      </p:transition>
+    </mc:Choice>
+    <mc:Fallback>
+      <p:transition spd="med">
+        <p:fade/>
+      </p:transition>
+    </mc:Fallback>
+  </mc:AlternateContent>
   <p:timing>
     <p:tnLst>
       <p:par>
@@ -9243,6 +11891,181 @@
                                   </p:childTnLst>
                                 </p:cTn>
                               </p:par>
+                              <p:par>
+                                <p:cTn id="28" presetID="10" presetClass="exit" presetSubtype="0" fill="hold" nodeType="withEffect">
+                                  <p:stCondLst>
+                                    <p:cond delay="0"/>
+                                  </p:stCondLst>
+                                  <p:childTnLst>
+                                    <p:animEffect transition="out" filter="fade">
+                                      <p:cBhvr>
+                                        <p:cTn id="29" dur="500"/>
+                                        <p:tgtEl>
+                                          <p:spTgt spid="6"/>
+                                        </p:tgtEl>
+                                      </p:cBhvr>
+                                    </p:animEffect>
+                                    <p:set>
+                                      <p:cBhvr>
+                                        <p:cTn id="30" dur="1" fill="hold">
+                                          <p:stCondLst>
+                                            <p:cond delay="499"/>
+                                          </p:stCondLst>
+                                        </p:cTn>
+                                        <p:tgtEl>
+                                          <p:spTgt spid="6"/>
+                                        </p:tgtEl>
+                                        <p:attrNameLst>
+                                          <p:attrName>style.visibility</p:attrName>
+                                        </p:attrNameLst>
+                                      </p:cBhvr>
+                                      <p:to>
+                                        <p:strVal val="hidden"/>
+                                      </p:to>
+                                    </p:set>
+                                  </p:childTnLst>
+                                </p:cTn>
+                              </p:par>
+                              <p:par>
+                                <p:cTn id="31" presetID="10" presetClass="exit" presetSubtype="0" fill="hold" nodeType="withEffect">
+                                  <p:stCondLst>
+                                    <p:cond delay="0"/>
+                                  </p:stCondLst>
+                                  <p:childTnLst>
+                                    <p:animEffect transition="out" filter="fade">
+                                      <p:cBhvr>
+                                        <p:cTn id="32" dur="500"/>
+                                        <p:tgtEl>
+                                          <p:spTgt spid="8"/>
+                                        </p:tgtEl>
+                                      </p:cBhvr>
+                                    </p:animEffect>
+                                    <p:set>
+                                      <p:cBhvr>
+                                        <p:cTn id="33" dur="1" fill="hold">
+                                          <p:stCondLst>
+                                            <p:cond delay="499"/>
+                                          </p:stCondLst>
+                                        </p:cTn>
+                                        <p:tgtEl>
+                                          <p:spTgt spid="8"/>
+                                        </p:tgtEl>
+                                        <p:attrNameLst>
+                                          <p:attrName>style.visibility</p:attrName>
+                                        </p:attrNameLst>
+                                      </p:cBhvr>
+                                      <p:to>
+                                        <p:strVal val="hidden"/>
+                                      </p:to>
+                                    </p:set>
+                                  </p:childTnLst>
+                                </p:cTn>
+                              </p:par>
+                              <p:par>
+                                <p:cTn id="34" presetID="10" presetClass="exit" presetSubtype="0" fill="hold" nodeType="withEffect">
+                                  <p:stCondLst>
+                                    <p:cond delay="0"/>
+                                  </p:stCondLst>
+                                  <p:childTnLst>
+                                    <p:animEffect transition="out" filter="fade">
+                                      <p:cBhvr>
+                                        <p:cTn id="35" dur="500"/>
+                                        <p:tgtEl>
+                                          <p:spTgt spid="10"/>
+                                        </p:tgtEl>
+                                      </p:cBhvr>
+                                    </p:animEffect>
+                                    <p:set>
+                                      <p:cBhvr>
+                                        <p:cTn id="36" dur="1" fill="hold">
+                                          <p:stCondLst>
+                                            <p:cond delay="499"/>
+                                          </p:stCondLst>
+                                        </p:cTn>
+                                        <p:tgtEl>
+                                          <p:spTgt spid="10"/>
+                                        </p:tgtEl>
+                                        <p:attrNameLst>
+                                          <p:attrName>style.visibility</p:attrName>
+                                        </p:attrNameLst>
+                                      </p:cBhvr>
+                                      <p:to>
+                                        <p:strVal val="hidden"/>
+                                      </p:to>
+                                    </p:set>
+                                  </p:childTnLst>
+                                </p:cTn>
+                              </p:par>
+                              <p:par>
+                                <p:cTn id="37" presetID="10" presetClass="exit" presetSubtype="0" fill="hold" nodeType="withEffect">
+                                  <p:stCondLst>
+                                    <p:cond delay="0"/>
+                                  </p:stCondLst>
+                                  <p:childTnLst>
+                                    <p:animEffect transition="out" filter="fade">
+                                      <p:cBhvr>
+                                        <p:cTn id="38" dur="500"/>
+                                        <p:tgtEl>
+                                          <p:spTgt spid="12"/>
+                                        </p:tgtEl>
+                                      </p:cBhvr>
+                                    </p:animEffect>
+                                    <p:set>
+                                      <p:cBhvr>
+                                        <p:cTn id="39" dur="1" fill="hold">
+                                          <p:stCondLst>
+                                            <p:cond delay="499"/>
+                                          </p:stCondLst>
+                                        </p:cTn>
+                                        <p:tgtEl>
+                                          <p:spTgt spid="12"/>
+                                        </p:tgtEl>
+                                        <p:attrNameLst>
+                                          <p:attrName>style.visibility</p:attrName>
+                                        </p:attrNameLst>
+                                      </p:cBhvr>
+                                      <p:to>
+                                        <p:strVal val="hidden"/>
+                                      </p:to>
+                                    </p:set>
+                                  </p:childTnLst>
+                                </p:cTn>
+                              </p:par>
+                              <p:par>
+                                <p:cTn id="40" presetID="10" presetClass="entr" presetSubtype="0" fill="hold" nodeType="withEffect">
+                                  <p:stCondLst>
+                                    <p:cond delay="0"/>
+                                  </p:stCondLst>
+                                  <p:childTnLst>
+                                    <p:set>
+                                      <p:cBhvr>
+                                        <p:cTn id="41" dur="1" fill="hold">
+                                          <p:stCondLst>
+                                            <p:cond delay="0"/>
+                                          </p:stCondLst>
+                                        </p:cTn>
+                                        <p:tgtEl>
+                                          <p:spTgt spid="4"/>
+                                        </p:tgtEl>
+                                        <p:attrNameLst>
+                                          <p:attrName>style.visibility</p:attrName>
+                                        </p:attrNameLst>
+                                      </p:cBhvr>
+                                      <p:to>
+                                        <p:strVal val="visible"/>
+                                      </p:to>
+                                    </p:set>
+                                    <p:animEffect transition="in" filter="fade">
+                                      <p:cBhvr>
+                                        <p:cTn id="42" dur="500"/>
+                                        <p:tgtEl>
+                                          <p:spTgt spid="4"/>
+                                        </p:tgtEl>
+                                      </p:cBhvr>
+                                    </p:animEffect>
+                                  </p:childTnLst>
+                                </p:cTn>
+                              </p:par>
                             </p:childTnLst>
                           </p:cTn>
                         </p:par>
@@ -9250,26 +12073,26 @@
                     </p:cTn>
                   </p:par>
                   <p:par>
-                    <p:cTn id="28" fill="hold">
+                    <p:cTn id="43" fill="hold">
                       <p:stCondLst>
                         <p:cond delay="indefinite"/>
                       </p:stCondLst>
                       <p:childTnLst>
                         <p:par>
-                          <p:cTn id="29" fill="hold">
+                          <p:cTn id="44" fill="hold">
                             <p:stCondLst>
                               <p:cond delay="0"/>
                             </p:stCondLst>
                             <p:childTnLst>
                               <p:par>
-                                <p:cTn id="30" presetID="10" presetClass="entr" presetSubtype="0" fill="hold" grpId="0" nodeType="clickEffect">
+                                <p:cTn id="45" presetID="10" presetClass="entr" presetSubtype="0" fill="hold" grpId="0" nodeType="clickEffect">
                                   <p:stCondLst>
                                     <p:cond delay="0"/>
                                   </p:stCondLst>
                                   <p:childTnLst>
                                     <p:set>
                                       <p:cBhvr>
-                                        <p:cTn id="31" dur="1" fill="hold">
+                                        <p:cTn id="46" dur="1" fill="hold">
                                           <p:stCondLst>
                                             <p:cond delay="0"/>
                                           </p:stCondLst>
@@ -9291,7 +12114,7 @@
                                     </p:set>
                                     <p:animEffect transition="in" filter="fade">
                                       <p:cBhvr>
-                                        <p:cTn id="32" dur="500"/>
+                                        <p:cTn id="47" dur="500"/>
                                         <p:tgtEl>
                                           <p:spTgt spid="3">
                                             <p:txEl>
@@ -9332,7 +12155,7 @@
       </p:par>
     </p:tnLst>
     <p:bldLst>
-      <p:bldP spid="3" grpId="0" build="p"/>
+      <p:bldP spid="3" grpId="0" uiExpand="1" build="p"/>
     </p:bldLst>
   </p:timing>
 </p:sld>
@@ -9412,25 +12235,29 @@
               <a:lstStyle/>
               <a:p>
                 <a:r>
+                  <a:rPr lang="en-GB" dirty="0">
+                    <a:latin typeface="Courier New" panose="02070309020205020404" pitchFamily="49" charset="0"/>
+                    <a:cs typeface="Courier New" panose="02070309020205020404" pitchFamily="49" charset="0"/>
+                  </a:rPr>
+                  <a:t>crop ~ species + density</a:t>
+                </a:r>
+                <a:endParaRPr lang="en-GB" dirty="0"/>
+              </a:p>
+              <a:p>
+                <a:r>
                   <a:rPr lang="en-GB" dirty="0"/>
-                  <a:t>So, </a:t>
+                  <a:t>By including </a:t>
                 </a:r>
                 <a:r>
                   <a:rPr lang="en-GB" dirty="0">
                     <a:latin typeface="Courier New" panose="02070309020205020404" pitchFamily="49" charset="0"/>
                     <a:cs typeface="Courier New" panose="02070309020205020404" pitchFamily="49" charset="0"/>
                   </a:rPr>
-                  <a:t>crop ~ species + density</a:t>
+                  <a:t>species</a:t>
                 </a:r>
                 <a:r>
                   <a:rPr lang="en-GB" dirty="0"/>
-                  <a:t>?</a:t>
-                </a:r>
-              </a:p>
-              <a:p>
-                <a:r>
-                  <a:rPr lang="en-GB" dirty="0"/>
-                  <a:t>By including species, we allow for each species to have their own intercept (</a:t>
+                  <a:t>, we allow for each species to have their own intercept (</a:t>
                 </a:r>
                 <a14:m>
                   <m:oMath xmlns:m="http://schemas.openxmlformats.org/officeDocument/2006/math">
@@ -9472,7 +12299,18 @@
               <a:p>
                 <a:r>
                   <a:rPr lang="en-GB" dirty="0"/>
-                  <a:t>But we only have a single parameter to describe density, so all species have the same slope (</a:t>
+                  <a:t>But we only have a single parameter to describe </a:t>
+                </a:r>
+                <a:r>
+                  <a:rPr lang="en-GB" dirty="0">
+                    <a:latin typeface="Courier New" panose="02070309020205020404" pitchFamily="49" charset="0"/>
+                    <a:cs typeface="Courier New" panose="02070309020205020404" pitchFamily="49" charset="0"/>
+                  </a:rPr>
+                  <a:t>density</a:t>
+                </a:r>
+                <a:r>
+                  <a:rPr lang="en-GB" dirty="0"/>
+                  <a:t>, so all species have the same slope (</a:t>
                 </a:r>
                 <a14:m>
                   <m:oMath xmlns:m="http://schemas.openxmlformats.org/officeDocument/2006/math">
@@ -9552,9 +12390,9 @@
                 <a:ext cx="6359525" cy="5240194"/>
               </a:xfrm>
               <a:blipFill>
-                <a:blip r:embed="rId2"/>
+                <a:blip r:embed="rId3"/>
                 <a:stretch>
-                  <a:fillRect l="-1726" r="-1918"/>
+                  <a:fillRect l="-1726" r="-1438"/>
                 </a:stretch>
               </a:blipFill>
             </p:spPr>
@@ -9608,6 +12446,234 @@
   <p:clrMapOvr>
     <a:masterClrMapping/>
   </p:clrMapOvr>
+  <mc:AlternateContent xmlns:mc="http://schemas.openxmlformats.org/markup-compatibility/2006">
+    <mc:Choice xmlns:p14="http://schemas.microsoft.com/office/powerpoint/2010/main" Requires="p14">
+      <p:transition spd="med" p14:dur="700">
+        <p:fade/>
+      </p:transition>
+    </mc:Choice>
+    <mc:Fallback>
+      <p:transition spd="med">
+        <p:fade/>
+      </p:transition>
+    </mc:Fallback>
+  </mc:AlternateContent>
+  <p:timing>
+    <p:tnLst>
+      <p:par>
+        <p:cTn id="1" dur="indefinite" restart="never" nodeType="tmRoot">
+          <p:childTnLst>
+            <p:seq concurrent="1" nextAc="seek">
+              <p:cTn id="2" dur="indefinite" nodeType="mainSeq">
+                <p:childTnLst>
+                  <p:par>
+                    <p:cTn id="3" fill="hold">
+                      <p:stCondLst>
+                        <p:cond delay="indefinite"/>
+                      </p:stCondLst>
+                      <p:childTnLst>
+                        <p:par>
+                          <p:cTn id="4" fill="hold">
+                            <p:stCondLst>
+                              <p:cond delay="0"/>
+                            </p:stCondLst>
+                            <p:childTnLst>
+                              <p:par>
+                                <p:cTn id="5" presetID="10" presetClass="entr" presetSubtype="0" fill="hold" grpId="0" nodeType="clickEffect">
+                                  <p:stCondLst>
+                                    <p:cond delay="0"/>
+                                  </p:stCondLst>
+                                  <p:childTnLst>
+                                    <p:set>
+                                      <p:cBhvr>
+                                        <p:cTn id="6" dur="1" fill="hold">
+                                          <p:stCondLst>
+                                            <p:cond delay="0"/>
+                                          </p:stCondLst>
+                                        </p:cTn>
+                                        <p:tgtEl>
+                                          <p:spTgt spid="3">
+                                            <p:txEl>
+                                              <p:pRg st="1" end="1"/>
+                                            </p:txEl>
+                                          </p:spTgt>
+                                        </p:tgtEl>
+                                        <p:attrNameLst>
+                                          <p:attrName>style.visibility</p:attrName>
+                                        </p:attrNameLst>
+                                      </p:cBhvr>
+                                      <p:to>
+                                        <p:strVal val="visible"/>
+                                      </p:to>
+                                    </p:set>
+                                    <p:animEffect transition="in" filter="fade">
+                                      <p:cBhvr>
+                                        <p:cTn id="7" dur="500"/>
+                                        <p:tgtEl>
+                                          <p:spTgt spid="3">
+                                            <p:txEl>
+                                              <p:pRg st="1" end="1"/>
+                                            </p:txEl>
+                                          </p:spTgt>
+                                        </p:tgtEl>
+                                      </p:cBhvr>
+                                    </p:animEffect>
+                                  </p:childTnLst>
+                                </p:cTn>
+                              </p:par>
+                            </p:childTnLst>
+                          </p:cTn>
+                        </p:par>
+                      </p:childTnLst>
+                    </p:cTn>
+                  </p:par>
+                  <p:par>
+                    <p:cTn id="8" fill="hold">
+                      <p:stCondLst>
+                        <p:cond delay="indefinite"/>
+                      </p:stCondLst>
+                      <p:childTnLst>
+                        <p:par>
+                          <p:cTn id="9" fill="hold">
+                            <p:stCondLst>
+                              <p:cond delay="0"/>
+                            </p:stCondLst>
+                            <p:childTnLst>
+                              <p:par>
+                                <p:cTn id="10" presetID="10" presetClass="entr" presetSubtype="0" fill="hold" grpId="0" nodeType="clickEffect">
+                                  <p:stCondLst>
+                                    <p:cond delay="0"/>
+                                  </p:stCondLst>
+                                  <p:childTnLst>
+                                    <p:set>
+                                      <p:cBhvr>
+                                        <p:cTn id="11" dur="1" fill="hold">
+                                          <p:stCondLst>
+                                            <p:cond delay="0"/>
+                                          </p:stCondLst>
+                                        </p:cTn>
+                                        <p:tgtEl>
+                                          <p:spTgt spid="3">
+                                            <p:txEl>
+                                              <p:pRg st="2" end="2"/>
+                                            </p:txEl>
+                                          </p:spTgt>
+                                        </p:tgtEl>
+                                        <p:attrNameLst>
+                                          <p:attrName>style.visibility</p:attrName>
+                                        </p:attrNameLst>
+                                      </p:cBhvr>
+                                      <p:to>
+                                        <p:strVal val="visible"/>
+                                      </p:to>
+                                    </p:set>
+                                    <p:animEffect transition="in" filter="fade">
+                                      <p:cBhvr>
+                                        <p:cTn id="12" dur="500"/>
+                                        <p:tgtEl>
+                                          <p:spTgt spid="3">
+                                            <p:txEl>
+                                              <p:pRg st="2" end="2"/>
+                                            </p:txEl>
+                                          </p:spTgt>
+                                        </p:tgtEl>
+                                      </p:cBhvr>
+                                    </p:animEffect>
+                                  </p:childTnLst>
+                                </p:cTn>
+                              </p:par>
+                            </p:childTnLst>
+                          </p:cTn>
+                        </p:par>
+                      </p:childTnLst>
+                    </p:cTn>
+                  </p:par>
+                  <p:par>
+                    <p:cTn id="13" fill="hold">
+                      <p:stCondLst>
+                        <p:cond delay="indefinite"/>
+                      </p:stCondLst>
+                      <p:childTnLst>
+                        <p:par>
+                          <p:cTn id="14" fill="hold">
+                            <p:stCondLst>
+                              <p:cond delay="0"/>
+                            </p:stCondLst>
+                            <p:childTnLst>
+                              <p:par>
+                                <p:cTn id="15" presetID="10" presetClass="entr" presetSubtype="0" fill="hold" grpId="0" nodeType="clickEffect">
+                                  <p:stCondLst>
+                                    <p:cond delay="0"/>
+                                  </p:stCondLst>
+                                  <p:childTnLst>
+                                    <p:set>
+                                      <p:cBhvr>
+                                        <p:cTn id="16" dur="1" fill="hold">
+                                          <p:stCondLst>
+                                            <p:cond delay="0"/>
+                                          </p:stCondLst>
+                                        </p:cTn>
+                                        <p:tgtEl>
+                                          <p:spTgt spid="3">
+                                            <p:txEl>
+                                              <p:pRg st="3" end="3"/>
+                                            </p:txEl>
+                                          </p:spTgt>
+                                        </p:tgtEl>
+                                        <p:attrNameLst>
+                                          <p:attrName>style.visibility</p:attrName>
+                                        </p:attrNameLst>
+                                      </p:cBhvr>
+                                      <p:to>
+                                        <p:strVal val="visible"/>
+                                      </p:to>
+                                    </p:set>
+                                    <p:animEffect transition="in" filter="fade">
+                                      <p:cBhvr>
+                                        <p:cTn id="17" dur="500"/>
+                                        <p:tgtEl>
+                                          <p:spTgt spid="3">
+                                            <p:txEl>
+                                              <p:pRg st="3" end="3"/>
+                                            </p:txEl>
+                                          </p:spTgt>
+                                        </p:tgtEl>
+                                      </p:cBhvr>
+                                    </p:animEffect>
+                                  </p:childTnLst>
+                                </p:cTn>
+                              </p:par>
+                            </p:childTnLst>
+                          </p:cTn>
+                        </p:par>
+                      </p:childTnLst>
+                    </p:cTn>
+                  </p:par>
+                </p:childTnLst>
+              </p:cTn>
+              <p:prevCondLst>
+                <p:cond evt="onPrev" delay="0">
+                  <p:tgtEl>
+                    <p:sldTgt/>
+                  </p:tgtEl>
+                </p:cond>
+              </p:prevCondLst>
+              <p:nextCondLst>
+                <p:cond evt="onNext" delay="0">
+                  <p:tgtEl>
+                    <p:sldTgt/>
+                  </p:tgtEl>
+                </p:cond>
+              </p:nextCondLst>
+            </p:seq>
+          </p:childTnLst>
+        </p:cTn>
+      </p:par>
+    </p:tnLst>
+    <p:bldLst>
+      <p:bldP spid="3" grpId="0" uiExpand="1" build="p"/>
+    </p:bldLst>
+  </p:timing>
 </p:sld>
 </file>
 
@@ -9786,6 +12852,18 @@
   <p:clrMapOvr>
     <a:masterClrMapping/>
   </p:clrMapOvr>
+  <mc:AlternateContent xmlns:mc="http://schemas.openxmlformats.org/markup-compatibility/2006">
+    <mc:Choice xmlns:p14="http://schemas.microsoft.com/office/powerpoint/2010/main" Requires="p14">
+      <p:transition spd="med" p14:dur="700">
+        <p:fade/>
+      </p:transition>
+    </mc:Choice>
+    <mc:Fallback>
+      <p:transition spd="med">
+        <p:fade/>
+      </p:transition>
+    </mc:Fallback>
+  </mc:AlternateContent>
   <p:timing>
     <p:tnLst>
       <p:par>
@@ -10083,8 +13161,8 @@
           <a:chExt cx="0" cy="0"/>
         </a:xfrm>
       </p:grpSpPr>
-      <mc:AlternateContent xmlns:mc="http://schemas.openxmlformats.org/markup-compatibility/2006">
-        <mc:Choice xmlns:a14="http://schemas.microsoft.com/office/drawing/2010/main" Requires="a14">
+      <mc:AlternateContent xmlns:mc="http://schemas.openxmlformats.org/markup-compatibility/2006" xmlns:a14="http://schemas.microsoft.com/office/drawing/2010/main">
+        <mc:Choice Requires="a14">
           <p:sp>
             <p:nvSpPr>
               <p:cNvPr id="2" name="Title 1">
@@ -10128,7 +13206,7 @@
             </p:txBody>
           </p:sp>
         </mc:Choice>
-        <mc:Fallback>
+        <mc:Fallback xmlns="">
           <p:sp>
             <p:nvSpPr>
               <p:cNvPr id="2" name="Title 1">
@@ -10178,6 +13256,18 @@
   <p:clrMapOvr>
     <a:masterClrMapping/>
   </p:clrMapOvr>
+  <mc:AlternateContent xmlns:mc="http://schemas.openxmlformats.org/markup-compatibility/2006">
+    <mc:Choice xmlns:p14="http://schemas.microsoft.com/office/powerpoint/2010/main" Requires="p14">
+      <p:transition spd="med" p14:dur="700">
+        <p:fade/>
+      </p:transition>
+    </mc:Choice>
+    <mc:Fallback>
+      <p:transition spd="med">
+        <p:fade/>
+      </p:transition>
+    </mc:Fallback>
+  </mc:AlternateContent>
 </p:sld>
 </file>
 
@@ -10249,23 +13339,7 @@
           <a:p>
             <a:r>
               <a:rPr lang="en-GB" dirty="0"/>
-              <a:t>Using only the following information, is my cup of coffee sweet?</a:t>
-            </a:r>
-          </a:p>
-          <a:p>
-            <a:pPr marL="514350" indent="-514350">
-              <a:buFont typeface="+mj-lt"/>
-              <a:buAutoNum type="arabicPeriod"/>
-            </a:pPr>
-            <a:r>
-              <a:rPr lang="en-GB" dirty="0"/>
-              <a:t>I have a cup of coffee</a:t>
-            </a:r>
-          </a:p>
-          <a:p>
-            <a:r>
-              <a:rPr lang="en-GB" dirty="0"/>
-              <a:t>Is my coffee sweet?</a:t>
+              <a:t>Using only the following information, tell me if my cup of coffee is sweet or not</a:t>
             </a:r>
           </a:p>
         </p:txBody>
@@ -10305,6 +13379,112 @@
   <p:clrMapOvr>
     <a:masterClrMapping/>
   </p:clrMapOvr>
+  <mc:AlternateContent xmlns:mc="http://schemas.openxmlformats.org/markup-compatibility/2006">
+    <mc:Choice xmlns:p14="http://schemas.microsoft.com/office/powerpoint/2010/main" Requires="p14">
+      <p:transition spd="med" p14:dur="700">
+        <p:fade/>
+      </p:transition>
+    </mc:Choice>
+    <mc:Fallback>
+      <p:transition spd="med">
+        <p:fade/>
+      </p:transition>
+    </mc:Fallback>
+  </mc:AlternateContent>
+  <p:timing>
+    <p:tnLst>
+      <p:par>
+        <p:cTn id="1" dur="indefinite" restart="never" nodeType="tmRoot">
+          <p:childTnLst>
+            <p:seq concurrent="1" nextAc="seek">
+              <p:cTn id="2" dur="indefinite" nodeType="mainSeq">
+                <p:childTnLst>
+                  <p:par>
+                    <p:cTn id="3" fill="hold">
+                      <p:stCondLst>
+                        <p:cond delay="indefinite"/>
+                      </p:stCondLst>
+                      <p:childTnLst>
+                        <p:par>
+                          <p:cTn id="4" fill="hold">
+                            <p:stCondLst>
+                              <p:cond delay="0"/>
+                            </p:stCondLst>
+                            <p:childTnLst>
+                              <p:par>
+                                <p:cTn id="5" presetID="10" presetClass="entr" presetSubtype="0" fill="hold" grpId="0" nodeType="clickEffect">
+                                  <p:stCondLst>
+                                    <p:cond delay="0"/>
+                                  </p:stCondLst>
+                                  <p:childTnLst>
+                                    <p:set>
+                                      <p:cBhvr>
+                                        <p:cTn id="6" dur="1" fill="hold">
+                                          <p:stCondLst>
+                                            <p:cond delay="0"/>
+                                          </p:stCondLst>
+                                        </p:cTn>
+                                        <p:tgtEl>
+                                          <p:spTgt spid="3">
+                                            <p:txEl>
+                                              <p:pRg st="0" end="0"/>
+                                            </p:txEl>
+                                          </p:spTgt>
+                                        </p:tgtEl>
+                                        <p:attrNameLst>
+                                          <p:attrName>style.visibility</p:attrName>
+                                        </p:attrNameLst>
+                                      </p:cBhvr>
+                                      <p:to>
+                                        <p:strVal val="visible"/>
+                                      </p:to>
+                                    </p:set>
+                                    <p:animEffect transition="in" filter="fade">
+                                      <p:cBhvr>
+                                        <p:cTn id="7" dur="500"/>
+                                        <p:tgtEl>
+                                          <p:spTgt spid="3">
+                                            <p:txEl>
+                                              <p:pRg st="0" end="0"/>
+                                            </p:txEl>
+                                          </p:spTgt>
+                                        </p:tgtEl>
+                                      </p:cBhvr>
+                                    </p:animEffect>
+                                  </p:childTnLst>
+                                </p:cTn>
+                              </p:par>
+                            </p:childTnLst>
+                          </p:cTn>
+                        </p:par>
+                      </p:childTnLst>
+                    </p:cTn>
+                  </p:par>
+                </p:childTnLst>
+              </p:cTn>
+              <p:prevCondLst>
+                <p:cond evt="onPrev" delay="0">
+                  <p:tgtEl>
+                    <p:sldTgt/>
+                  </p:tgtEl>
+                </p:cond>
+              </p:prevCondLst>
+              <p:nextCondLst>
+                <p:cond evt="onNext" delay="0">
+                  <p:tgtEl>
+                    <p:sldTgt/>
+                  </p:tgtEl>
+                </p:cond>
+              </p:nextCondLst>
+            </p:seq>
+          </p:childTnLst>
+        </p:cTn>
+      </p:par>
+    </p:tnLst>
+    <p:bldLst>
+      <p:bldP spid="3" grpId="0" build="p"/>
+    </p:bldLst>
+  </p:timing>
 </p:sld>
 </file>
 
@@ -10380,17 +13560,7 @@
             </a:pPr>
             <a:r>
               <a:rPr lang="en-GB" dirty="0"/>
-              <a:t>I have a cup of coffee</a:t>
-            </a:r>
-          </a:p>
-          <a:p>
-            <a:pPr marL="514350" indent="-514350">
-              <a:buFont typeface="+mj-lt"/>
-              <a:buAutoNum type="arabicPeriod"/>
-            </a:pPr>
-            <a:r>
-              <a:rPr lang="en-GB" dirty="0"/>
-              <a:t>I have stirred the coffee with a spoon</a:t>
+              <a:t>I stir my coffee with a spoon</a:t>
             </a:r>
           </a:p>
         </p:txBody>
@@ -10430,6 +13600,112 @@
   <p:clrMapOvr>
     <a:masterClrMapping/>
   </p:clrMapOvr>
+  <mc:AlternateContent xmlns:mc="http://schemas.openxmlformats.org/markup-compatibility/2006">
+    <mc:Choice xmlns:p14="http://schemas.microsoft.com/office/powerpoint/2010/main" Requires="p14">
+      <p:transition spd="med" p14:dur="700">
+        <p:fade/>
+      </p:transition>
+    </mc:Choice>
+    <mc:Fallback>
+      <p:transition spd="med">
+        <p:fade/>
+      </p:transition>
+    </mc:Fallback>
+  </mc:AlternateContent>
+  <p:timing>
+    <p:tnLst>
+      <p:par>
+        <p:cTn id="1" dur="indefinite" restart="never" nodeType="tmRoot">
+          <p:childTnLst>
+            <p:seq concurrent="1" nextAc="seek">
+              <p:cTn id="2" dur="indefinite" nodeType="mainSeq">
+                <p:childTnLst>
+                  <p:par>
+                    <p:cTn id="3" fill="hold">
+                      <p:stCondLst>
+                        <p:cond delay="indefinite"/>
+                      </p:stCondLst>
+                      <p:childTnLst>
+                        <p:par>
+                          <p:cTn id="4" fill="hold">
+                            <p:stCondLst>
+                              <p:cond delay="0"/>
+                            </p:stCondLst>
+                            <p:childTnLst>
+                              <p:par>
+                                <p:cTn id="5" presetID="10" presetClass="entr" presetSubtype="0" fill="hold" grpId="0" nodeType="clickEffect">
+                                  <p:stCondLst>
+                                    <p:cond delay="0"/>
+                                  </p:stCondLst>
+                                  <p:childTnLst>
+                                    <p:set>
+                                      <p:cBhvr>
+                                        <p:cTn id="6" dur="1" fill="hold">
+                                          <p:stCondLst>
+                                            <p:cond delay="0"/>
+                                          </p:stCondLst>
+                                        </p:cTn>
+                                        <p:tgtEl>
+                                          <p:spTgt spid="3">
+                                            <p:txEl>
+                                              <p:pRg st="0" end="0"/>
+                                            </p:txEl>
+                                          </p:spTgt>
+                                        </p:tgtEl>
+                                        <p:attrNameLst>
+                                          <p:attrName>style.visibility</p:attrName>
+                                        </p:attrNameLst>
+                                      </p:cBhvr>
+                                      <p:to>
+                                        <p:strVal val="visible"/>
+                                      </p:to>
+                                    </p:set>
+                                    <p:animEffect transition="in" filter="fade">
+                                      <p:cBhvr>
+                                        <p:cTn id="7" dur="500"/>
+                                        <p:tgtEl>
+                                          <p:spTgt spid="3">
+                                            <p:txEl>
+                                              <p:pRg st="0" end="0"/>
+                                            </p:txEl>
+                                          </p:spTgt>
+                                        </p:tgtEl>
+                                      </p:cBhvr>
+                                    </p:animEffect>
+                                  </p:childTnLst>
+                                </p:cTn>
+                              </p:par>
+                            </p:childTnLst>
+                          </p:cTn>
+                        </p:par>
+                      </p:childTnLst>
+                    </p:cTn>
+                  </p:par>
+                </p:childTnLst>
+              </p:cTn>
+              <p:prevCondLst>
+                <p:cond evt="onPrev" delay="0">
+                  <p:tgtEl>
+                    <p:sldTgt/>
+                  </p:tgtEl>
+                </p:cond>
+              </p:prevCondLst>
+              <p:nextCondLst>
+                <p:cond evt="onNext" delay="0">
+                  <p:tgtEl>
+                    <p:sldTgt/>
+                  </p:tgtEl>
+                </p:cond>
+              </p:nextCondLst>
+            </p:seq>
+          </p:childTnLst>
+        </p:cTn>
+      </p:par>
+    </p:tnLst>
+    <p:bldLst>
+      <p:bldP spid="3" grpId="0" build="p"/>
+    </p:bldLst>
+  </p:timing>
 </p:sld>
 </file>
 
@@ -10505,17 +13781,7 @@
             </a:pPr>
             <a:r>
               <a:rPr lang="en-GB" dirty="0"/>
-              <a:t>I have a cup of coffee</a:t>
-            </a:r>
-          </a:p>
-          <a:p>
-            <a:pPr marL="514350" indent="-514350">
-              <a:buFont typeface="+mj-lt"/>
-              <a:buAutoNum type="arabicPeriod"/>
-            </a:pPr>
-            <a:r>
-              <a:rPr lang="en-GB" dirty="0"/>
-              <a:t>I have added sugar to the coffee</a:t>
+              <a:t>I add sugar to my coffee</a:t>
             </a:r>
           </a:p>
         </p:txBody>
@@ -10555,6 +13821,18 @@
   <p:clrMapOvr>
     <a:masterClrMapping/>
   </p:clrMapOvr>
+  <mc:AlternateContent xmlns:mc="http://schemas.openxmlformats.org/markup-compatibility/2006">
+    <mc:Choice xmlns:p14="http://schemas.microsoft.com/office/powerpoint/2010/main" Requires="p14">
+      <p:transition spd="med" p14:dur="700">
+        <p:fade/>
+      </p:transition>
+    </mc:Choice>
+    <mc:Fallback>
+      <p:transition spd="med">
+        <p:fade/>
+      </p:transition>
+    </mc:Fallback>
+  </mc:AlternateContent>
 </p:sld>
 </file>
 
@@ -10777,4 +14055,319 @@
     </a:ext>
   </a:extLst>
 </a:theme>
+</file>
+
+<file path=ppt/theme/theme2.xml><?xml version="1.0" encoding="utf-8"?>
+<a:theme xmlns:a="http://schemas.openxmlformats.org/drawingml/2006/main" name="Office Theme">
+  <a:themeElements>
+    <a:clrScheme name="Office">
+      <a:dk1>
+        <a:sysClr val="windowText" lastClr="000000"/>
+      </a:dk1>
+      <a:lt1>
+        <a:sysClr val="window" lastClr="FFFFFF"/>
+      </a:lt1>
+      <a:dk2>
+        <a:srgbClr val="0E2841"/>
+      </a:dk2>
+      <a:lt2>
+        <a:srgbClr val="E8E8E8"/>
+      </a:lt2>
+      <a:accent1>
+        <a:srgbClr val="156082"/>
+      </a:accent1>
+      <a:accent2>
+        <a:srgbClr val="E97132"/>
+      </a:accent2>
+      <a:accent3>
+        <a:srgbClr val="196B24"/>
+      </a:accent3>
+      <a:accent4>
+        <a:srgbClr val="0F9ED5"/>
+      </a:accent4>
+      <a:accent5>
+        <a:srgbClr val="A02B93"/>
+      </a:accent5>
+      <a:accent6>
+        <a:srgbClr val="4EA72E"/>
+      </a:accent6>
+      <a:hlink>
+        <a:srgbClr val="467886"/>
+      </a:hlink>
+      <a:folHlink>
+        <a:srgbClr val="96607D"/>
+      </a:folHlink>
+    </a:clrScheme>
+    <a:fontScheme name="Office">
+      <a:majorFont>
+        <a:latin typeface="Aptos Display" panose="02110004020202020204"/>
+        <a:ea typeface=""/>
+        <a:cs typeface=""/>
+        <a:font script="Jpan" typeface="游ゴシック Light"/>
+        <a:font script="Hang" typeface="맑은 고딕"/>
+        <a:font script="Hans" typeface="等线 Light"/>
+        <a:font script="Hant" typeface="新細明體"/>
+        <a:font script="Arab" typeface="Times New Roman"/>
+        <a:font script="Hebr" typeface="Times New Roman"/>
+        <a:font script="Thai" typeface="Angsana New"/>
+        <a:font script="Ethi" typeface="Nyala"/>
+        <a:font script="Beng" typeface="Vrinda"/>
+        <a:font script="Gujr" typeface="Shruti"/>
+        <a:font script="Khmr" typeface="MoolBoran"/>
+        <a:font script="Knda" typeface="Tunga"/>
+        <a:font script="Guru" typeface="Raavi"/>
+        <a:font script="Cans" typeface="Euphemia"/>
+        <a:font script="Cher" typeface="Plantagenet Cherokee"/>
+        <a:font script="Yiii" typeface="Microsoft Yi Baiti"/>
+        <a:font script="Tibt" typeface="Microsoft Himalaya"/>
+        <a:font script="Thaa" typeface="MV Boli"/>
+        <a:font script="Deva" typeface="Mangal"/>
+        <a:font script="Telu" typeface="Gautami"/>
+        <a:font script="Taml" typeface="Latha"/>
+        <a:font script="Syrc" typeface="Estrangelo Edessa"/>
+        <a:font script="Orya" typeface="Kalinga"/>
+        <a:font script="Mlym" typeface="Kartika"/>
+        <a:font script="Laoo" typeface="DokChampa"/>
+        <a:font script="Sinh" typeface="Iskoola Pota"/>
+        <a:font script="Mong" typeface="Mongolian Baiti"/>
+        <a:font script="Viet" typeface="Times New Roman"/>
+        <a:font script="Uigh" typeface="Microsoft Uighur"/>
+        <a:font script="Geor" typeface="Sylfaen"/>
+        <a:font script="Armn" typeface="Arial"/>
+        <a:font script="Bugi" typeface="Leelawadee UI"/>
+        <a:font script="Bopo" typeface="Microsoft JhengHei"/>
+        <a:font script="Java" typeface="Javanese Text"/>
+        <a:font script="Lisu" typeface="Segoe UI"/>
+        <a:font script="Mymr" typeface="Myanmar Text"/>
+        <a:font script="Nkoo" typeface="Ebrima"/>
+        <a:font script="Olck" typeface="Nirmala UI"/>
+        <a:font script="Osma" typeface="Ebrima"/>
+        <a:font script="Phag" typeface="Phagspa"/>
+        <a:font script="Syrn" typeface="Estrangelo Edessa"/>
+        <a:font script="Syrj" typeface="Estrangelo Edessa"/>
+        <a:font script="Syre" typeface="Estrangelo Edessa"/>
+        <a:font script="Sora" typeface="Nirmala UI"/>
+        <a:font script="Tale" typeface="Microsoft Tai Le"/>
+        <a:font script="Talu" typeface="Microsoft New Tai Lue"/>
+        <a:font script="Tfng" typeface="Ebrima"/>
+      </a:majorFont>
+      <a:minorFont>
+        <a:latin typeface="Aptos" panose="02110004020202020204"/>
+        <a:ea typeface=""/>
+        <a:cs typeface=""/>
+        <a:font script="Jpan" typeface="游ゴシック"/>
+        <a:font script="Hang" typeface="맑은 고딕"/>
+        <a:font script="Hans" typeface="等线"/>
+        <a:font script="Hant" typeface="新細明體"/>
+        <a:font script="Arab" typeface="Arial"/>
+        <a:font script="Hebr" typeface="Arial"/>
+        <a:font script="Thai" typeface="Cordia New"/>
+        <a:font script="Ethi" typeface="Nyala"/>
+        <a:font script="Beng" typeface="Vrinda"/>
+        <a:font script="Gujr" typeface="Shruti"/>
+        <a:font script="Khmr" typeface="DaunPenh"/>
+        <a:font script="Knda" typeface="Tunga"/>
+        <a:font script="Guru" typeface="Raavi"/>
+        <a:font script="Cans" typeface="Euphemia"/>
+        <a:font script="Cher" typeface="Plantagenet Cherokee"/>
+        <a:font script="Yiii" typeface="Microsoft Yi Baiti"/>
+        <a:font script="Tibt" typeface="Microsoft Himalaya"/>
+        <a:font script="Thaa" typeface="MV Boli"/>
+        <a:font script="Deva" typeface="Mangal"/>
+        <a:font script="Telu" typeface="Gautami"/>
+        <a:font script="Taml" typeface="Latha"/>
+        <a:font script="Syrc" typeface="Estrangelo Edessa"/>
+        <a:font script="Orya" typeface="Kalinga"/>
+        <a:font script="Mlym" typeface="Kartika"/>
+        <a:font script="Laoo" typeface="DokChampa"/>
+        <a:font script="Sinh" typeface="Iskoola Pota"/>
+        <a:font script="Mong" typeface="Mongolian Baiti"/>
+        <a:font script="Viet" typeface="Arial"/>
+        <a:font script="Uigh" typeface="Microsoft Uighur"/>
+        <a:font script="Geor" typeface="Sylfaen"/>
+        <a:font script="Armn" typeface="Arial"/>
+        <a:font script="Bugi" typeface="Leelawadee UI"/>
+        <a:font script="Bopo" typeface="Microsoft JhengHei"/>
+        <a:font script="Java" typeface="Javanese Text"/>
+        <a:font script="Lisu" typeface="Segoe UI"/>
+        <a:font script="Mymr" typeface="Myanmar Text"/>
+        <a:font script="Nkoo" typeface="Ebrima"/>
+        <a:font script="Olck" typeface="Nirmala UI"/>
+        <a:font script="Osma" typeface="Ebrima"/>
+        <a:font script="Phag" typeface="Phagspa"/>
+        <a:font script="Syrn" typeface="Estrangelo Edessa"/>
+        <a:font script="Syrj" typeface="Estrangelo Edessa"/>
+        <a:font script="Syre" typeface="Estrangelo Edessa"/>
+        <a:font script="Sora" typeface="Nirmala UI"/>
+        <a:font script="Tale" typeface="Microsoft Tai Le"/>
+        <a:font script="Talu" typeface="Microsoft New Tai Lue"/>
+        <a:font script="Tfng" typeface="Ebrima"/>
+      </a:minorFont>
+    </a:fontScheme>
+    <a:fmtScheme name="Office">
+      <a:fillStyleLst>
+        <a:solidFill>
+          <a:schemeClr val="phClr"/>
+        </a:solidFill>
+        <a:gradFill rotWithShape="1">
+          <a:gsLst>
+            <a:gs pos="0">
+              <a:schemeClr val="phClr">
+                <a:lumMod val="110000"/>
+                <a:satMod val="105000"/>
+                <a:tint val="67000"/>
+              </a:schemeClr>
+            </a:gs>
+            <a:gs pos="50000">
+              <a:schemeClr val="phClr">
+                <a:lumMod val="105000"/>
+                <a:satMod val="103000"/>
+                <a:tint val="73000"/>
+              </a:schemeClr>
+            </a:gs>
+            <a:gs pos="100000">
+              <a:schemeClr val="phClr">
+                <a:lumMod val="105000"/>
+                <a:satMod val="109000"/>
+                <a:tint val="81000"/>
+              </a:schemeClr>
+            </a:gs>
+          </a:gsLst>
+          <a:lin ang="5400000" scaled="0"/>
+        </a:gradFill>
+        <a:gradFill rotWithShape="1">
+          <a:gsLst>
+            <a:gs pos="0">
+              <a:schemeClr val="phClr">
+                <a:satMod val="103000"/>
+                <a:lumMod val="102000"/>
+                <a:tint val="94000"/>
+              </a:schemeClr>
+            </a:gs>
+            <a:gs pos="50000">
+              <a:schemeClr val="phClr">
+                <a:satMod val="110000"/>
+                <a:lumMod val="100000"/>
+                <a:shade val="100000"/>
+              </a:schemeClr>
+            </a:gs>
+            <a:gs pos="100000">
+              <a:schemeClr val="phClr">
+                <a:lumMod val="99000"/>
+                <a:satMod val="120000"/>
+                <a:shade val="78000"/>
+              </a:schemeClr>
+            </a:gs>
+          </a:gsLst>
+          <a:lin ang="5400000" scaled="0"/>
+        </a:gradFill>
+      </a:fillStyleLst>
+      <a:lnStyleLst>
+        <a:ln w="12700" cap="flat" cmpd="sng" algn="ctr">
+          <a:solidFill>
+            <a:schemeClr val="phClr"/>
+          </a:solidFill>
+          <a:prstDash val="solid"/>
+          <a:miter lim="800000"/>
+        </a:ln>
+        <a:ln w="19050" cap="flat" cmpd="sng" algn="ctr">
+          <a:solidFill>
+            <a:schemeClr val="phClr"/>
+          </a:solidFill>
+          <a:prstDash val="solid"/>
+          <a:miter lim="800000"/>
+        </a:ln>
+        <a:ln w="25400" cap="flat" cmpd="sng" algn="ctr">
+          <a:solidFill>
+            <a:schemeClr val="phClr"/>
+          </a:solidFill>
+          <a:prstDash val="solid"/>
+          <a:miter lim="800000"/>
+        </a:ln>
+      </a:lnStyleLst>
+      <a:effectStyleLst>
+        <a:effectStyle>
+          <a:effectLst/>
+        </a:effectStyle>
+        <a:effectStyle>
+          <a:effectLst/>
+        </a:effectStyle>
+        <a:effectStyle>
+          <a:effectLst>
+            <a:outerShdw blurRad="57150" dist="19050" dir="5400000" algn="ctr" rotWithShape="0">
+              <a:srgbClr val="000000">
+                <a:alpha val="63000"/>
+              </a:srgbClr>
+            </a:outerShdw>
+          </a:effectLst>
+        </a:effectStyle>
+      </a:effectStyleLst>
+      <a:bgFillStyleLst>
+        <a:solidFill>
+          <a:schemeClr val="phClr"/>
+        </a:solidFill>
+        <a:solidFill>
+          <a:schemeClr val="phClr">
+            <a:tint val="95000"/>
+            <a:satMod val="170000"/>
+          </a:schemeClr>
+        </a:solidFill>
+        <a:gradFill rotWithShape="1">
+          <a:gsLst>
+            <a:gs pos="0">
+              <a:schemeClr val="phClr">
+                <a:tint val="93000"/>
+                <a:satMod val="150000"/>
+                <a:shade val="98000"/>
+                <a:lumMod val="102000"/>
+              </a:schemeClr>
+            </a:gs>
+            <a:gs pos="50000">
+              <a:schemeClr val="phClr">
+                <a:tint val="98000"/>
+                <a:satMod val="130000"/>
+                <a:shade val="90000"/>
+                <a:lumMod val="103000"/>
+              </a:schemeClr>
+            </a:gs>
+            <a:gs pos="100000">
+              <a:schemeClr val="phClr">
+                <a:shade val="63000"/>
+                <a:satMod val="120000"/>
+              </a:schemeClr>
+            </a:gs>
+          </a:gsLst>
+          <a:lin ang="5400000" scaled="0"/>
+        </a:gradFill>
+      </a:bgFillStyleLst>
+    </a:fmtScheme>
+  </a:themeElements>
+  <a:objectDefaults>
+    <a:lnDef>
+      <a:spPr/>
+      <a:bodyPr/>
+      <a:lstStyle/>
+      <a:style>
+        <a:lnRef idx="2">
+          <a:schemeClr val="accent1"/>
+        </a:lnRef>
+        <a:fillRef idx="0">
+          <a:schemeClr val="accent1"/>
+        </a:fillRef>
+        <a:effectRef idx="1">
+          <a:schemeClr val="accent1"/>
+        </a:effectRef>
+        <a:fontRef idx="minor">
+          <a:schemeClr val="tx1"/>
+        </a:fontRef>
+      </a:style>
+    </a:lnDef>
+  </a:objectDefaults>
+  <a:extraClrSchemeLst/>
+  <a:extLst>
+    <a:ext uri="{05A4C25C-085E-4340-85A3-A5531E510DB2}">
+      <thm15:themeFamily xmlns:thm15="http://schemas.microsoft.com/office/thememl/2012/main" name="Office Theme" id="{2E142A2C-CD16-42D6-873A-C26D2A0506FA}" vid="{1BDDFF52-6CD6-40A5-AB3C-68EB2F1E4D0A}"/>
+    </a:ext>
+  </a:extLst>
+</a:theme>
 </file>
</xml_diff>